<commit_message>
presentacion final corregida y en pdf
</commit_message>
<xml_diff>
--- a/presentacion final/Control de cambios.pptx
+++ b/presentacion final/Control de cambios.pptx
@@ -9,32 +9,32 @@
   </p:notesMasterIdLst>
   <p:sldIdLst>
     <p:sldId id="256" r:id="rId2"/>
-    <p:sldId id="257" r:id="rId3"/>
-    <p:sldId id="258" r:id="rId4"/>
-    <p:sldId id="260" r:id="rId5"/>
-    <p:sldId id="261" r:id="rId6"/>
-    <p:sldId id="262" r:id="rId7"/>
-    <p:sldId id="265" r:id="rId8"/>
-    <p:sldId id="272" r:id="rId9"/>
-    <p:sldId id="266" r:id="rId10"/>
-    <p:sldId id="287" r:id="rId11"/>
-    <p:sldId id="269" r:id="rId12"/>
-    <p:sldId id="279" r:id="rId13"/>
-    <p:sldId id="280" r:id="rId14"/>
-    <p:sldId id="278" r:id="rId15"/>
-    <p:sldId id="273" r:id="rId16"/>
-    <p:sldId id="267" r:id="rId17"/>
-    <p:sldId id="281" r:id="rId18"/>
-    <p:sldId id="282" r:id="rId19"/>
-    <p:sldId id="274" r:id="rId20"/>
-    <p:sldId id="276" r:id="rId21"/>
-    <p:sldId id="285" r:id="rId22"/>
-    <p:sldId id="283" r:id="rId23"/>
-    <p:sldId id="275" r:id="rId24"/>
-    <p:sldId id="277" r:id="rId25"/>
-    <p:sldId id="286" r:id="rId26"/>
-    <p:sldId id="284" r:id="rId27"/>
-    <p:sldId id="268" r:id="rId28"/>
+    <p:sldId id="258" r:id="rId3"/>
+    <p:sldId id="260" r:id="rId4"/>
+    <p:sldId id="261" r:id="rId5"/>
+    <p:sldId id="262" r:id="rId6"/>
+    <p:sldId id="265" r:id="rId7"/>
+    <p:sldId id="272" r:id="rId8"/>
+    <p:sldId id="266" r:id="rId9"/>
+    <p:sldId id="287" r:id="rId10"/>
+    <p:sldId id="269" r:id="rId11"/>
+    <p:sldId id="279" r:id="rId12"/>
+    <p:sldId id="280" r:id="rId13"/>
+    <p:sldId id="278" r:id="rId14"/>
+    <p:sldId id="273" r:id="rId15"/>
+    <p:sldId id="267" r:id="rId16"/>
+    <p:sldId id="281" r:id="rId17"/>
+    <p:sldId id="282" r:id="rId18"/>
+    <p:sldId id="274" r:id="rId19"/>
+    <p:sldId id="276" r:id="rId20"/>
+    <p:sldId id="285" r:id="rId21"/>
+    <p:sldId id="283" r:id="rId22"/>
+    <p:sldId id="275" r:id="rId23"/>
+    <p:sldId id="277" r:id="rId24"/>
+    <p:sldId id="286" r:id="rId25"/>
+    <p:sldId id="284" r:id="rId26"/>
+    <p:sldId id="268" r:id="rId27"/>
+    <p:sldId id="288" r:id="rId28"/>
   </p:sldIdLst>
   <p:sldSz cx="9144000" cy="6858000" type="screen4x3"/>
   <p:notesSz cx="6858000" cy="9144000"/>
@@ -5173,11 +5173,7 @@
         <a:p>
           <a:r>
             <a:rPr lang="es-MX" dirty="0" smtClean="0"/>
-            <a:t>Ana </a:t>
-          </a:r>
-          <a:r>
-            <a:rPr lang="es-MX" dirty="0" smtClean="0"/>
-            <a:t>Revuelta</a:t>
+            <a:t>Ana Revuelta</a:t>
           </a:r>
           <a:endParaRPr lang="es-MX" dirty="0"/>
         </a:p>
@@ -15755,7 +15751,7 @@
             <a:fld id="{7A2F545D-266C-466D-8E7F-CCF87E5371AD}" type="datetimeFigureOut">
               <a:rPr lang="en-US" smtClean="0"/>
               <a:pPr/>
-              <a:t>11/25/2009</a:t>
+              <a:t>11/26/2009</a:t>
             </a:fld>
             <a:endParaRPr lang="es-MX"/>
           </a:p>
@@ -18417,7 +18413,7 @@
             <a:fld id="{CAB3BA64-2C5E-473A-B401-FF227916131C}" type="datetimeFigureOut">
               <a:rPr lang="en-US" smtClean="0"/>
               <a:pPr/>
-              <a:t>11/25/2009</a:t>
+              <a:t>11/26/2009</a:t>
             </a:fld>
             <a:endParaRPr lang="es-MX"/>
           </a:p>
@@ -18584,7 +18580,7 @@
             <a:fld id="{CAB3BA64-2C5E-473A-B401-FF227916131C}" type="datetimeFigureOut">
               <a:rPr lang="en-US" smtClean="0"/>
               <a:pPr/>
-              <a:t>11/25/2009</a:t>
+              <a:t>11/26/2009</a:t>
             </a:fld>
             <a:endParaRPr lang="es-MX"/>
           </a:p>
@@ -18761,7 +18757,7 @@
             <a:fld id="{CAB3BA64-2C5E-473A-B401-FF227916131C}" type="datetimeFigureOut">
               <a:rPr lang="en-US" smtClean="0"/>
               <a:pPr/>
-              <a:t>11/25/2009</a:t>
+              <a:t>11/26/2009</a:t>
             </a:fld>
             <a:endParaRPr lang="es-MX"/>
           </a:p>
@@ -18928,7 +18924,7 @@
             <a:fld id="{CAB3BA64-2C5E-473A-B401-FF227916131C}" type="datetimeFigureOut">
               <a:rPr lang="en-US" smtClean="0"/>
               <a:pPr/>
-              <a:t>11/25/2009</a:t>
+              <a:t>11/26/2009</a:t>
             </a:fld>
             <a:endParaRPr lang="es-MX"/>
           </a:p>
@@ -19171,7 +19167,7 @@
             <a:fld id="{CAB3BA64-2C5E-473A-B401-FF227916131C}" type="datetimeFigureOut">
               <a:rPr lang="en-US" smtClean="0"/>
               <a:pPr/>
-              <a:t>11/25/2009</a:t>
+              <a:t>11/26/2009</a:t>
             </a:fld>
             <a:endParaRPr lang="es-MX"/>
           </a:p>
@@ -19456,7 +19452,7 @@
             <a:fld id="{CAB3BA64-2C5E-473A-B401-FF227916131C}" type="datetimeFigureOut">
               <a:rPr lang="en-US" smtClean="0"/>
               <a:pPr/>
-              <a:t>11/25/2009</a:t>
+              <a:t>11/26/2009</a:t>
             </a:fld>
             <a:endParaRPr lang="es-MX"/>
           </a:p>
@@ -19875,7 +19871,7 @@
             <a:fld id="{CAB3BA64-2C5E-473A-B401-FF227916131C}" type="datetimeFigureOut">
               <a:rPr lang="en-US" smtClean="0"/>
               <a:pPr/>
-              <a:t>11/25/2009</a:t>
+              <a:t>11/26/2009</a:t>
             </a:fld>
             <a:endParaRPr lang="es-MX"/>
           </a:p>
@@ -19990,7 +19986,7 @@
             <a:fld id="{CAB3BA64-2C5E-473A-B401-FF227916131C}" type="datetimeFigureOut">
               <a:rPr lang="en-US" smtClean="0"/>
               <a:pPr/>
-              <a:t>11/25/2009</a:t>
+              <a:t>11/26/2009</a:t>
             </a:fld>
             <a:endParaRPr lang="es-MX"/>
           </a:p>
@@ -20082,7 +20078,7 @@
             <a:fld id="{CAB3BA64-2C5E-473A-B401-FF227916131C}" type="datetimeFigureOut">
               <a:rPr lang="en-US" smtClean="0"/>
               <a:pPr/>
-              <a:t>11/25/2009</a:t>
+              <a:t>11/26/2009</a:t>
             </a:fld>
             <a:endParaRPr lang="es-MX"/>
           </a:p>
@@ -20356,7 +20352,7 @@
             <a:fld id="{CAB3BA64-2C5E-473A-B401-FF227916131C}" type="datetimeFigureOut">
               <a:rPr lang="en-US" smtClean="0"/>
               <a:pPr/>
-              <a:t>11/25/2009</a:t>
+              <a:t>11/26/2009</a:t>
             </a:fld>
             <a:endParaRPr lang="es-MX"/>
           </a:p>
@@ -20606,7 +20602,7 @@
             <a:fld id="{CAB3BA64-2C5E-473A-B401-FF227916131C}" type="datetimeFigureOut">
               <a:rPr lang="en-US" smtClean="0"/>
               <a:pPr/>
-              <a:t>11/25/2009</a:t>
+              <a:t>11/26/2009</a:t>
             </a:fld>
             <a:endParaRPr lang="es-MX"/>
           </a:p>
@@ -20816,7 +20812,7 @@
             <a:fld id="{CAB3BA64-2C5E-473A-B401-FF227916131C}" type="datetimeFigureOut">
               <a:rPr lang="en-US" smtClean="0"/>
               <a:pPr/>
-              <a:t>11/25/2009</a:t>
+              <a:t>11/26/2009</a:t>
             </a:fld>
             <a:endParaRPr lang="es-MX"/>
           </a:p>
@@ -21181,7 +21177,7 @@
           </a:blip>
           <a:srcRect/>
           <a:stretch>
-            <a:fillRect t="-2000" b="-2000"/>
+            <a:fillRect t="-44000" b="-44000"/>
           </a:stretch>
         </a:blipFill>
         <a:effectLst/>
@@ -21201,36 +21197,152 @@
           <a:chExt cx="0" cy="0"/>
         </a:xfrm>
       </p:grpSpPr>
-      <p:pic>
-        <p:nvPicPr>
-          <p:cNvPr id="11" name="10 Imagen" descr="Instituto_Tecnologico_de_Monterrey_pq.jpg"/>
-          <p:cNvPicPr>
-            <a:picLocks noChangeAspect="1"/>
-          </p:cNvPicPr>
+      <p:sp>
+        <p:nvSpPr>
+          <p:cNvPr id="3" name="7 Título"/>
+          <p:cNvSpPr txBox="1">
+            <a:spLocks/>
+          </p:cNvSpPr>
           <p:nvPr/>
-        </p:nvPicPr>
-        <p:blipFill>
-          <a:blip r:embed="rId4"/>
-          <a:stretch>
-            <a:fillRect/>
-          </a:stretch>
-        </p:blipFill>
+        </p:nvSpPr>
         <p:spPr>
           <a:xfrm>
-            <a:off x="6643702" y="0"/>
-            <a:ext cx="2500298" cy="1238520"/>
+            <a:off x="4214810" y="1316033"/>
+            <a:ext cx="4929190" cy="1470025"/>
           </a:xfrm>
           <a:prstGeom prst="rect">
             <a:avLst/>
           </a:prstGeom>
-          <a:ln>
-            <a:noFill/>
-          </a:ln>
-          <a:effectLst>
-            <a:softEdge rad="112500"/>
-          </a:effectLst>
         </p:spPr>
-      </p:pic>
+        <p:txBody>
+          <a:bodyPr>
+            <a:normAutofit fontScale="92500" lnSpcReduction="20000"/>
+          </a:bodyPr>
+          <a:lstStyle/>
+          <a:p>
+            <a:pPr marL="0" marR="0" lvl="0" indent="0" algn="ctr" defTabSz="914400" rtl="0" eaLnBrk="1" fontAlgn="auto" latinLnBrk="0" hangingPunct="1">
+              <a:lnSpc>
+                <a:spcPct val="100000"/>
+              </a:lnSpc>
+              <a:spcBef>
+                <a:spcPct val="20000"/>
+              </a:spcBef>
+              <a:spcAft>
+                <a:spcPts val="0"/>
+              </a:spcAft>
+              <a:buClrTx/>
+              <a:buSzTx/>
+              <a:buFontTx/>
+              <a:buNone/>
+              <a:tabLst/>
+              <a:defRPr/>
+            </a:pPr>
+            <a:r>
+              <a:rPr kumimoji="0" lang="es-MX" sz="6000" b="1" i="0" u="none" strike="noStrike" kern="1200" cap="none" spc="0" normalizeH="0" baseline="0" noProof="0" dirty="0" smtClean="0">
+                <a:ln>
+                  <a:noFill/>
+                </a:ln>
+                <a:solidFill>
+                  <a:srgbClr val="235397"/>
+                </a:solidFill>
+                <a:effectLst/>
+                <a:uLnTx/>
+                <a:uFillTx/>
+                <a:latin typeface="Century Gothic" pitchFamily="34" charset="0"/>
+                <a:ea typeface="+mn-ea"/>
+                <a:cs typeface="+mn-cs"/>
+              </a:rPr>
+              <a:t>PROCTER &amp; GAMBLE</a:t>
+            </a:r>
+            <a:endParaRPr kumimoji="0" lang="es-MX" sz="6000" b="1" i="0" u="none" strike="noStrike" kern="1200" cap="none" spc="0" normalizeH="0" baseline="0" noProof="0" dirty="0">
+              <a:ln>
+                <a:noFill/>
+              </a:ln>
+              <a:solidFill>
+                <a:srgbClr val="235397"/>
+              </a:solidFill>
+              <a:effectLst/>
+              <a:uLnTx/>
+              <a:uFillTx/>
+              <a:latin typeface="Century Gothic" pitchFamily="34" charset="0"/>
+              <a:ea typeface="+mn-ea"/>
+              <a:cs typeface="+mn-cs"/>
+            </a:endParaRPr>
+          </a:p>
+        </p:txBody>
+      </p:sp>
+      <p:sp>
+        <p:nvSpPr>
+          <p:cNvPr id="4" name="8 Subtítulo"/>
+          <p:cNvSpPr txBox="1">
+            <a:spLocks/>
+          </p:cNvSpPr>
+          <p:nvPr/>
+        </p:nvSpPr>
+        <p:spPr>
+          <a:xfrm>
+            <a:off x="4143372" y="2957506"/>
+            <a:ext cx="5000660" cy="1185874"/>
+          </a:xfrm>
+          <a:prstGeom prst="rect">
+            <a:avLst/>
+          </a:prstGeom>
+        </p:spPr>
+        <p:txBody>
+          <a:bodyPr>
+            <a:noAutofit/>
+          </a:bodyPr>
+          <a:lstStyle/>
+          <a:p>
+            <a:pPr marL="342900" marR="0" lvl="0" indent="-342900" algn="ctr" defTabSz="914400" rtl="0" eaLnBrk="1" fontAlgn="auto" latinLnBrk="0" hangingPunct="1">
+              <a:lnSpc>
+                <a:spcPct val="100000"/>
+              </a:lnSpc>
+              <a:spcBef>
+                <a:spcPct val="20000"/>
+              </a:spcBef>
+              <a:spcAft>
+                <a:spcPts val="0"/>
+              </a:spcAft>
+              <a:buClrTx/>
+              <a:buSzTx/>
+              <a:tabLst/>
+              <a:defRPr/>
+            </a:pPr>
+            <a:r>
+              <a:rPr kumimoji="0" lang="es-MX" sz="3600" b="0" i="0" u="none" strike="noStrike" kern="1200" cap="none" spc="0" normalizeH="0" baseline="0" noProof="0" dirty="0" smtClean="0">
+                <a:ln>
+                  <a:noFill/>
+                </a:ln>
+                <a:solidFill>
+                  <a:srgbClr val="235397"/>
+                </a:solidFill>
+                <a:effectLst/>
+                <a:uLnTx/>
+                <a:uFillTx/>
+                <a:latin typeface="Century Gothic" pitchFamily="34" charset="0"/>
+                <a:ea typeface="+mn-ea"/>
+                <a:cs typeface="+mn-cs"/>
+              </a:rPr>
+              <a:t>Sistema de control de cambios</a:t>
+            </a:r>
+            <a:endParaRPr kumimoji="0" lang="es-MX" sz="3600" b="0" i="0" u="none" strike="noStrike" kern="1200" cap="none" spc="0" normalizeH="0" baseline="0" noProof="0" dirty="0">
+              <a:ln>
+                <a:noFill/>
+              </a:ln>
+              <a:solidFill>
+                <a:srgbClr val="235397"/>
+              </a:solidFill>
+              <a:effectLst/>
+              <a:uLnTx/>
+              <a:uFillTx/>
+              <a:latin typeface="Century Gothic" pitchFamily="34" charset="0"/>
+              <a:ea typeface="+mn-ea"/>
+              <a:cs typeface="+mn-cs"/>
+            </a:endParaRPr>
+          </a:p>
+        </p:txBody>
+      </p:sp>
     </p:spTree>
   </p:cSld>
   <p:clrMapOvr>
@@ -21273,265 +21385,7 @@
         </p:nvSpPr>
         <p:spPr bwMode="auto">
           <a:xfrm>
-            <a:off x="5811893" y="696708"/>
-            <a:ext cx="1417376" cy="446276"/>
-          </a:xfrm>
-          <a:prstGeom prst="rect">
-            <a:avLst/>
-          </a:prstGeom>
-          <a:noFill/>
-          <a:ln w="9525">
-            <a:noFill/>
-            <a:miter lim="800000"/>
-            <a:headEnd/>
-            <a:tailEnd/>
-          </a:ln>
-        </p:spPr>
-        <p:txBody>
-          <a:bodyPr wrap="none">
-            <a:spAutoFit/>
-          </a:bodyPr>
-          <a:lstStyle/>
-          <a:p>
-            <a:pPr algn="r"/>
-            <a:r>
-              <a:rPr lang="es-ES_tradnl" sz="2300" dirty="0" smtClean="0">
-                <a:solidFill>
-                  <a:srgbClr val="929396"/>
-                </a:solidFill>
-                <a:latin typeface="Century Gothic" pitchFamily="34" charset="0"/>
-              </a:rPr>
-              <a:t>REPORTE</a:t>
-            </a:r>
-            <a:endParaRPr lang="es-ES_tradnl" sz="2300" dirty="0">
-              <a:solidFill>
-                <a:srgbClr val="929396"/>
-              </a:solidFill>
-              <a:latin typeface="Century Gothic" pitchFamily="34" charset="0"/>
-            </a:endParaRPr>
-          </a:p>
-        </p:txBody>
-      </p:sp>
-      <p:sp>
-        <p:nvSpPr>
-          <p:cNvPr id="7" name="CuadroTexto 5"/>
-          <p:cNvSpPr txBox="1">
-            <a:spLocks noChangeArrowheads="1"/>
-          </p:cNvSpPr>
-          <p:nvPr/>
-        </p:nvSpPr>
-        <p:spPr bwMode="auto">
-          <a:xfrm>
-            <a:off x="357158" y="1357298"/>
-            <a:ext cx="8286780" cy="338554"/>
-          </a:xfrm>
-          <a:prstGeom prst="rect">
-            <a:avLst/>
-          </a:prstGeom>
-          <a:noFill/>
-          <a:ln w="9525">
-            <a:noFill/>
-            <a:miter lim="800000"/>
-            <a:headEnd/>
-            <a:tailEnd/>
-          </a:ln>
-        </p:spPr>
-        <p:txBody>
-          <a:bodyPr wrap="square">
-            <a:spAutoFit/>
-          </a:bodyPr>
-          <a:lstStyle/>
-          <a:p>
-            <a:pPr algn="just"/>
-            <a:r>
-              <a:rPr lang="es-MX" sz="1600" dirty="0" smtClean="0">
-                <a:solidFill>
-                  <a:srgbClr val="235397"/>
-                </a:solidFill>
-                <a:latin typeface="Century Gothic" pitchFamily="34" charset="0"/>
-              </a:rPr>
-              <a:t>Muestra informe general de los cambios</a:t>
-            </a:r>
-            <a:endParaRPr lang="es-MX" sz="1600" dirty="0">
-              <a:solidFill>
-                <a:srgbClr val="235397"/>
-              </a:solidFill>
-              <a:latin typeface="Century Gothic" pitchFamily="34" charset="0"/>
-            </a:endParaRPr>
-          </a:p>
-        </p:txBody>
-      </p:sp>
-      <p:sp>
-        <p:nvSpPr>
-          <p:cNvPr id="8" name="7 Rectángulo"/>
-          <p:cNvSpPr/>
-          <p:nvPr/>
-        </p:nvSpPr>
-        <p:spPr>
-          <a:xfrm>
-            <a:off x="0" y="6429396"/>
-            <a:ext cx="9144000" cy="285728"/>
-          </a:xfrm>
-          <a:prstGeom prst="rect">
-            <a:avLst/>
-          </a:prstGeom>
-          <a:solidFill>
-            <a:schemeClr val="accent1">
-              <a:lumMod val="75000"/>
-            </a:schemeClr>
-          </a:solidFill>
-          <a:ln>
-            <a:solidFill>
-              <a:schemeClr val="accent1">
-                <a:lumMod val="75000"/>
-              </a:schemeClr>
-            </a:solidFill>
-          </a:ln>
-        </p:spPr>
-        <p:style>
-          <a:lnRef idx="2">
-            <a:schemeClr val="accent1">
-              <a:shade val="50000"/>
-            </a:schemeClr>
-          </a:lnRef>
-          <a:fillRef idx="1">
-            <a:schemeClr val="accent1"/>
-          </a:fillRef>
-          <a:effectRef idx="0">
-            <a:schemeClr val="accent1"/>
-          </a:effectRef>
-          <a:fontRef idx="minor">
-            <a:schemeClr val="lt1"/>
-          </a:fontRef>
-        </p:style>
-        <p:txBody>
-          <a:bodyPr rtlCol="0" anchor="ctr"/>
-          <a:lstStyle/>
-          <a:p>
-            <a:pPr algn="ctr"/>
-            <a:endParaRPr lang="es-MX"/>
-          </a:p>
-        </p:txBody>
-      </p:sp>
-      <p:pic>
-        <p:nvPicPr>
-          <p:cNvPr id="11" name="10 Imagen" descr="tec-logo-full.jpg"/>
-          <p:cNvPicPr>
-            <a:picLocks noChangeAspect="1"/>
-          </p:cNvPicPr>
-          <p:nvPr/>
-        </p:nvPicPr>
-        <p:blipFill>
-          <a:blip r:embed="rId3" cstate="print"/>
-          <a:stretch>
-            <a:fillRect/>
-          </a:stretch>
-        </p:blipFill>
-        <p:spPr>
-          <a:xfrm>
-            <a:off x="7537561" y="6200801"/>
-            <a:ext cx="1606471" cy="585785"/>
-          </a:xfrm>
-          <a:prstGeom prst="rect">
-            <a:avLst/>
-          </a:prstGeom>
-        </p:spPr>
-      </p:pic>
-      <p:pic>
-        <p:nvPicPr>
-          <p:cNvPr id="36866" name="Picture 2" descr="http://www.stockwatch.in/files/Procter-Gamble.bmp"/>
-          <p:cNvPicPr>
-            <a:picLocks noChangeAspect="1" noChangeArrowheads="1"/>
-          </p:cNvPicPr>
-          <p:nvPr/>
-        </p:nvPicPr>
-        <p:blipFill>
-          <a:blip r:embed="rId4" cstate="print"/>
-          <a:srcRect/>
-          <a:stretch>
-            <a:fillRect/>
-          </a:stretch>
-        </p:blipFill>
-        <p:spPr bwMode="auto">
-          <a:xfrm>
-            <a:off x="-32" y="-24"/>
-            <a:ext cx="1070774" cy="642942"/>
-          </a:xfrm>
-          <a:prstGeom prst="rect">
-            <a:avLst/>
-          </a:prstGeom>
-          <a:noFill/>
-        </p:spPr>
-      </p:pic>
-      <p:pic>
-        <p:nvPicPr>
-          <p:cNvPr id="73730" name="Picture 2" descr="F:\prints\reporte.bmp"/>
-          <p:cNvPicPr>
-            <a:picLocks noChangeAspect="1" noChangeArrowheads="1"/>
-          </p:cNvPicPr>
-          <p:nvPr/>
-        </p:nvPicPr>
-        <p:blipFill>
-          <a:blip r:embed="rId5"/>
-          <a:srcRect/>
-          <a:stretch>
-            <a:fillRect/>
-          </a:stretch>
-        </p:blipFill>
-        <p:spPr bwMode="auto">
-          <a:xfrm>
-            <a:off x="882672" y="1714488"/>
-            <a:ext cx="6832600" cy="4577617"/>
-          </a:xfrm>
-          <a:prstGeom prst="rect">
-            <a:avLst/>
-          </a:prstGeom>
-          <a:noFill/>
-        </p:spPr>
-      </p:pic>
-    </p:spTree>
-  </p:cSld>
-  <p:clrMapOvr>
-    <a:masterClrMapping/>
-  </p:clrMapOvr>
-  <p:timing>
-    <p:tnLst>
-      <p:par>
-        <p:cTn id="1" dur="indefinite" restart="never" nodeType="tmRoot"/>
-      </p:par>
-    </p:tnLst>
-  </p:timing>
-</p:sld>
-</file>
-
-<file path=ppt/slides/slide11.xml><?xml version="1.0" encoding="utf-8"?>
-<p:sld xmlns:a="http://schemas.openxmlformats.org/drawingml/2006/main" xmlns:r="http://schemas.openxmlformats.org/officeDocument/2006/relationships" xmlns:p="http://schemas.openxmlformats.org/presentationml/2006/main">
-  <p:cSld>
-    <p:spTree>
-      <p:nvGrpSpPr>
-        <p:cNvPr id="1" name=""/>
-        <p:cNvGrpSpPr/>
-        <p:nvPr/>
-      </p:nvGrpSpPr>
-      <p:grpSpPr>
-        <a:xfrm>
-          <a:off x="0" y="0"/>
-          <a:ext cx="0" cy="0"/>
-          <a:chOff x="0" y="0"/>
-          <a:chExt cx="0" cy="0"/>
-        </a:xfrm>
-      </p:grpSpPr>
-      <p:sp>
-        <p:nvSpPr>
-          <p:cNvPr id="6" name="CuadroTexto 2"/>
-          <p:cNvSpPr txBox="1">
-            <a:spLocks noChangeArrowheads="1"/>
-          </p:cNvSpPr>
-          <p:nvPr/>
-        </p:nvSpPr>
-        <p:spPr bwMode="auto">
-          <a:xfrm>
-            <a:off x="5756822" y="504825"/>
+            <a:off x="6286512" y="504825"/>
             <a:ext cx="1555234" cy="446276"/>
           </a:xfrm>
           <a:prstGeom prst="rect">
@@ -21580,7 +21434,7 @@
         </p:nvSpPr>
         <p:spPr bwMode="auto">
           <a:xfrm>
-            <a:off x="357158" y="1714488"/>
+            <a:off x="357158" y="1142984"/>
             <a:ext cx="8286780" cy="584775"/>
           </a:xfrm>
           <a:prstGeom prst="rect">
@@ -21619,32 +21473,6 @@
           </a:p>
         </p:txBody>
       </p:sp>
-      <p:pic>
-        <p:nvPicPr>
-          <p:cNvPr id="8" name="Picture 2" descr="http://www.stockwatch.in/files/Procter-Gamble.bmp"/>
-          <p:cNvPicPr>
-            <a:picLocks noChangeAspect="1" noChangeArrowheads="1"/>
-          </p:cNvPicPr>
-          <p:nvPr/>
-        </p:nvPicPr>
-        <p:blipFill>
-          <a:blip r:embed="rId3" cstate="print"/>
-          <a:srcRect/>
-          <a:stretch>
-            <a:fillRect/>
-          </a:stretch>
-        </p:blipFill>
-        <p:spPr bwMode="auto">
-          <a:xfrm>
-            <a:off x="-32" y="-24"/>
-            <a:ext cx="1070774" cy="642942"/>
-          </a:xfrm>
-          <a:prstGeom prst="rect">
-            <a:avLst/>
-          </a:prstGeom>
-          <a:noFill/>
-        </p:spPr>
-      </p:pic>
       <p:sp>
         <p:nvSpPr>
           <p:cNvPr id="9" name="8 Rectángulo"/>
@@ -21706,7 +21534,7 @@
           <p:nvPr/>
         </p:nvPicPr>
         <p:blipFill>
-          <a:blip r:embed="rId4" cstate="print"/>
+          <a:blip r:embed="rId3" cstate="print"/>
           <a:stretch>
             <a:fillRect/>
           </a:stretch>
@@ -21730,7 +21558,7 @@
           <p:nvPr/>
         </p:nvPicPr>
         <p:blipFill>
-          <a:blip r:embed="rId5"/>
+          <a:blip r:embed="rId4"/>
           <a:srcRect/>
           <a:stretch>
             <a:fillRect/>
@@ -21738,8 +21566,59 @@
         </p:blipFill>
         <p:spPr bwMode="auto">
           <a:xfrm>
-            <a:off x="214282" y="2290782"/>
-            <a:ext cx="8724900" cy="3924300"/>
+            <a:off x="214282" y="1714488"/>
+            <a:ext cx="8724900" cy="4500594"/>
+          </a:xfrm>
+          <a:prstGeom prst="rect">
+            <a:avLst/>
+          </a:prstGeom>
+          <a:noFill/>
+        </p:spPr>
+      </p:pic>
+      <p:pic>
+        <p:nvPicPr>
+          <p:cNvPr id="11" name="10 Imagen" descr="blanco_sangre.jpg"/>
+          <p:cNvPicPr>
+            <a:picLocks noChangeAspect="1"/>
+          </p:cNvPicPr>
+          <p:nvPr/>
+        </p:nvPicPr>
+        <p:blipFill>
+          <a:blip r:embed="rId5"/>
+          <a:srcRect l="59376" t="6169" r="14374" b="35389"/>
+          <a:stretch>
+            <a:fillRect/>
+          </a:stretch>
+        </p:blipFill>
+        <p:spPr>
+          <a:xfrm>
+            <a:off x="7786742" y="244943"/>
+            <a:ext cx="785786" cy="898041"/>
+          </a:xfrm>
+          <a:prstGeom prst="rect">
+            <a:avLst/>
+          </a:prstGeom>
+        </p:spPr>
+      </p:pic>
+      <p:pic>
+        <p:nvPicPr>
+          <p:cNvPr id="8" name="Picture 2" descr="http://www.stockwatch.in/files/Procter-Gamble.bmp"/>
+          <p:cNvPicPr>
+            <a:picLocks noChangeAspect="1" noChangeArrowheads="1"/>
+          </p:cNvPicPr>
+          <p:nvPr/>
+        </p:nvPicPr>
+        <p:blipFill>
+          <a:blip r:embed="rId6" cstate="print"/>
+          <a:srcRect/>
+          <a:stretch>
+            <a:fillRect/>
+          </a:stretch>
+        </p:blipFill>
+        <p:spPr bwMode="auto">
+          <a:xfrm>
+            <a:off x="0" y="6215058"/>
+            <a:ext cx="1070774" cy="642942"/>
           </a:xfrm>
           <a:prstGeom prst="rect">
             <a:avLst/>
@@ -21762,7 +21641,7 @@
 </p:sld>
 </file>
 
-<file path=ppt/slides/slide12.xml><?xml version="1.0" encoding="utf-8"?>
+<file path=ppt/slides/slide11.xml><?xml version="1.0" encoding="utf-8"?>
 <p:sld xmlns:a="http://schemas.openxmlformats.org/drawingml/2006/main" xmlns:r="http://schemas.openxmlformats.org/officeDocument/2006/relationships" xmlns:p="http://schemas.openxmlformats.org/presentationml/2006/main">
   <p:cSld>
     <p:spTree>
@@ -21789,7 +21668,7 @@
         </p:nvSpPr>
         <p:spPr bwMode="auto">
           <a:xfrm>
-            <a:off x="6433290" y="504825"/>
+            <a:off x="7000892" y="504825"/>
             <a:ext cx="878767" cy="446276"/>
           </a:xfrm>
           <a:prstGeom prst="rect">
@@ -21877,32 +21756,6 @@
           </a:p>
         </p:txBody>
       </p:sp>
-      <p:pic>
-        <p:nvPicPr>
-          <p:cNvPr id="9" name="Picture 2" descr="http://www.stockwatch.in/files/Procter-Gamble.bmp"/>
-          <p:cNvPicPr>
-            <a:picLocks noChangeAspect="1" noChangeArrowheads="1"/>
-          </p:cNvPicPr>
-          <p:nvPr/>
-        </p:nvPicPr>
-        <p:blipFill>
-          <a:blip r:embed="rId3" cstate="print"/>
-          <a:srcRect/>
-          <a:stretch>
-            <a:fillRect/>
-          </a:stretch>
-        </p:blipFill>
-        <p:spPr bwMode="auto">
-          <a:xfrm>
-            <a:off x="-32" y="-24"/>
-            <a:ext cx="1070774" cy="642942"/>
-          </a:xfrm>
-          <a:prstGeom prst="rect">
-            <a:avLst/>
-          </a:prstGeom>
-          <a:noFill/>
-        </p:spPr>
-      </p:pic>
       <p:sp>
         <p:nvSpPr>
           <p:cNvPr id="10" name="9 Rectángulo"/>
@@ -21964,7 +21817,7 @@
           <p:nvPr/>
         </p:nvPicPr>
         <p:blipFill>
-          <a:blip r:embed="rId4" cstate="print"/>
+          <a:blip r:embed="rId3" cstate="print"/>
           <a:stretch>
             <a:fillRect/>
           </a:stretch>
@@ -21988,7 +21841,7 @@
           <p:nvPr/>
         </p:nvPicPr>
         <p:blipFill>
-          <a:blip r:embed="rId5"/>
+          <a:blip r:embed="rId4"/>
           <a:srcRect/>
           <a:stretch>
             <a:fillRect/>
@@ -21998,6 +21851,57 @@
           <a:xfrm>
             <a:off x="652488" y="1358459"/>
             <a:ext cx="7491412" cy="4856623"/>
+          </a:xfrm>
+          <a:prstGeom prst="rect">
+            <a:avLst/>
+          </a:prstGeom>
+          <a:noFill/>
+        </p:spPr>
+      </p:pic>
+      <p:pic>
+        <p:nvPicPr>
+          <p:cNvPr id="8" name="7 Imagen" descr="blanco_sangre.jpg"/>
+          <p:cNvPicPr>
+            <a:picLocks noChangeAspect="1"/>
+          </p:cNvPicPr>
+          <p:nvPr/>
+        </p:nvPicPr>
+        <p:blipFill>
+          <a:blip r:embed="rId5"/>
+          <a:srcRect l="59376" t="6169" r="14374" b="35389"/>
+          <a:stretch>
+            <a:fillRect/>
+          </a:stretch>
+        </p:blipFill>
+        <p:spPr>
+          <a:xfrm>
+            <a:off x="7786742" y="244943"/>
+            <a:ext cx="785786" cy="898041"/>
+          </a:xfrm>
+          <a:prstGeom prst="rect">
+            <a:avLst/>
+          </a:prstGeom>
+        </p:spPr>
+      </p:pic>
+      <p:pic>
+        <p:nvPicPr>
+          <p:cNvPr id="9" name="Picture 2" descr="http://www.stockwatch.in/files/Procter-Gamble.bmp"/>
+          <p:cNvPicPr>
+            <a:picLocks noChangeAspect="1" noChangeArrowheads="1"/>
+          </p:cNvPicPr>
+          <p:nvPr/>
+        </p:nvPicPr>
+        <p:blipFill>
+          <a:blip r:embed="rId6" cstate="print"/>
+          <a:srcRect/>
+          <a:stretch>
+            <a:fillRect/>
+          </a:stretch>
+        </p:blipFill>
+        <p:spPr bwMode="auto">
+          <a:xfrm>
+            <a:off x="0" y="6215058"/>
+            <a:ext cx="1070774" cy="642942"/>
           </a:xfrm>
           <a:prstGeom prst="rect">
             <a:avLst/>
@@ -22020,7 +21924,7 @@
 </p:sld>
 </file>
 
-<file path=ppt/slides/slide13.xml><?xml version="1.0" encoding="utf-8"?>
+<file path=ppt/slides/slide12.xml><?xml version="1.0" encoding="utf-8"?>
 <p:sld xmlns:a="http://schemas.openxmlformats.org/drawingml/2006/main" xmlns:r="http://schemas.openxmlformats.org/officeDocument/2006/relationships" xmlns:p="http://schemas.openxmlformats.org/presentationml/2006/main">
   <p:cSld>
     <p:spTree>
@@ -22047,7 +21951,7 @@
         </p:nvSpPr>
         <p:spPr bwMode="auto">
           <a:xfrm>
-            <a:off x="5506755" y="504825"/>
+            <a:off x="6072198" y="504825"/>
             <a:ext cx="1805302" cy="446276"/>
           </a:xfrm>
           <a:prstGeom prst="rect">
@@ -22096,7 +22000,7 @@
         </p:nvSpPr>
         <p:spPr bwMode="auto">
           <a:xfrm>
-            <a:off x="357158" y="1071546"/>
+            <a:off x="357158" y="1129713"/>
             <a:ext cx="8286780" cy="584775"/>
           </a:xfrm>
           <a:prstGeom prst="rect">
@@ -22135,32 +22039,6 @@
           </a:p>
         </p:txBody>
       </p:sp>
-      <p:pic>
-        <p:nvPicPr>
-          <p:cNvPr id="9" name="Picture 2" descr="http://www.stockwatch.in/files/Procter-Gamble.bmp"/>
-          <p:cNvPicPr>
-            <a:picLocks noChangeAspect="1" noChangeArrowheads="1"/>
-          </p:cNvPicPr>
-          <p:nvPr/>
-        </p:nvPicPr>
-        <p:blipFill>
-          <a:blip r:embed="rId3" cstate="print"/>
-          <a:srcRect/>
-          <a:stretch>
-            <a:fillRect/>
-          </a:stretch>
-        </p:blipFill>
-        <p:spPr bwMode="auto">
-          <a:xfrm>
-            <a:off x="-32" y="-24"/>
-            <a:ext cx="1070774" cy="642942"/>
-          </a:xfrm>
-          <a:prstGeom prst="rect">
-            <a:avLst/>
-          </a:prstGeom>
-          <a:noFill/>
-        </p:spPr>
-      </p:pic>
       <p:sp>
         <p:nvSpPr>
           <p:cNvPr id="10" name="9 Rectángulo"/>
@@ -22222,7 +22100,7 @@
           <p:nvPr/>
         </p:nvPicPr>
         <p:blipFill>
-          <a:blip r:embed="rId4" cstate="print"/>
+          <a:blip r:embed="rId3" cstate="print"/>
           <a:stretch>
             <a:fillRect/>
           </a:stretch>
@@ -22246,7 +22124,7 @@
           <p:nvPr/>
         </p:nvPicPr>
         <p:blipFill>
-          <a:blip r:embed="rId5"/>
+          <a:blip r:embed="rId4"/>
           <a:srcRect/>
           <a:stretch>
             <a:fillRect/>
@@ -22254,8 +22132,59 @@
         </p:blipFill>
         <p:spPr bwMode="auto">
           <a:xfrm>
-            <a:off x="642910" y="1784808"/>
-            <a:ext cx="8024840" cy="4444527"/>
+            <a:off x="357158" y="1626546"/>
+            <a:ext cx="8310592" cy="4602790"/>
+          </a:xfrm>
+          <a:prstGeom prst="rect">
+            <a:avLst/>
+          </a:prstGeom>
+          <a:noFill/>
+        </p:spPr>
+      </p:pic>
+      <p:pic>
+        <p:nvPicPr>
+          <p:cNvPr id="8" name="7 Imagen" descr="blanco_sangre.jpg"/>
+          <p:cNvPicPr>
+            <a:picLocks noChangeAspect="1"/>
+          </p:cNvPicPr>
+          <p:nvPr/>
+        </p:nvPicPr>
+        <p:blipFill>
+          <a:blip r:embed="rId5"/>
+          <a:srcRect l="59376" t="6169" r="14374" b="35389"/>
+          <a:stretch>
+            <a:fillRect/>
+          </a:stretch>
+        </p:blipFill>
+        <p:spPr>
+          <a:xfrm>
+            <a:off x="7786742" y="244943"/>
+            <a:ext cx="785786" cy="898041"/>
+          </a:xfrm>
+          <a:prstGeom prst="rect">
+            <a:avLst/>
+          </a:prstGeom>
+        </p:spPr>
+      </p:pic>
+      <p:pic>
+        <p:nvPicPr>
+          <p:cNvPr id="9" name="Picture 2" descr="http://www.stockwatch.in/files/Procter-Gamble.bmp"/>
+          <p:cNvPicPr>
+            <a:picLocks noChangeAspect="1" noChangeArrowheads="1"/>
+          </p:cNvPicPr>
+          <p:nvPr/>
+        </p:nvPicPr>
+        <p:blipFill>
+          <a:blip r:embed="rId6" cstate="print"/>
+          <a:srcRect/>
+          <a:stretch>
+            <a:fillRect/>
+          </a:stretch>
+        </p:blipFill>
+        <p:spPr bwMode="auto">
+          <a:xfrm>
+            <a:off x="0" y="6215058"/>
+            <a:ext cx="1070774" cy="642942"/>
           </a:xfrm>
           <a:prstGeom prst="rect">
             <a:avLst/>
@@ -22278,7 +22207,7 @@
 </p:sld>
 </file>
 
-<file path=ppt/slides/slide14.xml><?xml version="1.0" encoding="utf-8"?>
+<file path=ppt/slides/slide13.xml><?xml version="1.0" encoding="utf-8"?>
 <p:sld xmlns:a="http://schemas.openxmlformats.org/drawingml/2006/main" xmlns:r="http://schemas.openxmlformats.org/officeDocument/2006/relationships" xmlns:p="http://schemas.openxmlformats.org/presentationml/2006/main">
   <p:cSld>
     <p:spTree>
@@ -22305,7 +22234,7 @@
         </p:nvSpPr>
         <p:spPr bwMode="auto">
           <a:xfrm>
-            <a:off x="5643570" y="696708"/>
+            <a:off x="6286512" y="482394"/>
             <a:ext cx="1585690" cy="446276"/>
           </a:xfrm>
           <a:prstGeom prst="rect">
@@ -22486,7 +22415,7 @@
         </p:blipFill>
         <p:spPr bwMode="auto">
           <a:xfrm>
-            <a:off x="-32" y="-24"/>
+            <a:off x="0" y="6215058"/>
             <a:ext cx="1070774" cy="642942"/>
           </a:xfrm>
           <a:prstGeom prst="rect">
@@ -22512,13 +22441,38 @@
         </p:blipFill>
         <p:spPr bwMode="auto">
           <a:xfrm>
-            <a:off x="785786" y="1554486"/>
-            <a:ext cx="6572296" cy="4632929"/>
+            <a:off x="571472" y="1554486"/>
+            <a:ext cx="7929618" cy="4632929"/>
           </a:xfrm>
           <a:prstGeom prst="rect">
             <a:avLst/>
           </a:prstGeom>
           <a:noFill/>
+        </p:spPr>
+      </p:pic>
+      <p:pic>
+        <p:nvPicPr>
+          <p:cNvPr id="9" name="8 Imagen" descr="blanco_sangre.jpg"/>
+          <p:cNvPicPr>
+            <a:picLocks noChangeAspect="1"/>
+          </p:cNvPicPr>
+          <p:nvPr/>
+        </p:nvPicPr>
+        <p:blipFill>
+          <a:blip r:embed="rId6"/>
+          <a:srcRect l="59376" t="6169" r="14374" b="35389"/>
+          <a:stretch>
+            <a:fillRect/>
+          </a:stretch>
+        </p:blipFill>
+        <p:spPr>
+          <a:xfrm>
+            <a:off x="7786742" y="244943"/>
+            <a:ext cx="785786" cy="898041"/>
+          </a:xfrm>
+          <a:prstGeom prst="rect">
+            <a:avLst/>
+          </a:prstGeom>
         </p:spPr>
       </p:pic>
     </p:spTree>
@@ -22536,7 +22490,7 @@
 </p:sld>
 </file>
 
-<file path=ppt/slides/slide15.xml><?xml version="1.0" encoding="utf-8"?>
+<file path=ppt/slides/slide14.xml><?xml version="1.0" encoding="utf-8"?>
 <p:sld xmlns:a="http://schemas.openxmlformats.org/drawingml/2006/main" xmlns:r="http://schemas.openxmlformats.org/officeDocument/2006/relationships" xmlns:p="http://schemas.openxmlformats.org/presentationml/2006/main">
   <p:cSld>
     <p:spTree>
@@ -22569,32 +22523,6 @@
           </a:graphicData>
         </a:graphic>
       </p:graphicFrame>
-      <p:pic>
-        <p:nvPicPr>
-          <p:cNvPr id="8" name="Picture 2" descr="http://www.stockwatch.in/files/Procter-Gamble.bmp"/>
-          <p:cNvPicPr>
-            <a:picLocks noChangeAspect="1" noChangeArrowheads="1"/>
-          </p:cNvPicPr>
-          <p:nvPr/>
-        </p:nvPicPr>
-        <p:blipFill>
-          <a:blip r:embed="rId7" cstate="print"/>
-          <a:srcRect/>
-          <a:stretch>
-            <a:fillRect/>
-          </a:stretch>
-        </p:blipFill>
-        <p:spPr bwMode="auto">
-          <a:xfrm>
-            <a:off x="-32" y="-24"/>
-            <a:ext cx="1070774" cy="642942"/>
-          </a:xfrm>
-          <a:prstGeom prst="rect">
-            <a:avLst/>
-          </a:prstGeom>
-          <a:noFill/>
-        </p:spPr>
-      </p:pic>
       <p:sp>
         <p:nvSpPr>
           <p:cNvPr id="9" name="8 Rectángulo"/>
@@ -22656,7 +22584,7 @@
           <p:nvPr/>
         </p:nvPicPr>
         <p:blipFill>
-          <a:blip r:embed="rId8" cstate="print"/>
+          <a:blip r:embed="rId7" cstate="print"/>
           <a:stretch>
             <a:fillRect/>
           </a:stretch>
@@ -22665,6 +22593,57 @@
           <a:xfrm>
             <a:off x="7537561" y="6200801"/>
             <a:ext cx="1606471" cy="585785"/>
+          </a:xfrm>
+          <a:prstGeom prst="rect">
+            <a:avLst/>
+          </a:prstGeom>
+        </p:spPr>
+      </p:pic>
+      <p:pic>
+        <p:nvPicPr>
+          <p:cNvPr id="8" name="Picture 2" descr="http://www.stockwatch.in/files/Procter-Gamble.bmp"/>
+          <p:cNvPicPr>
+            <a:picLocks noChangeAspect="1" noChangeArrowheads="1"/>
+          </p:cNvPicPr>
+          <p:nvPr/>
+        </p:nvPicPr>
+        <p:blipFill>
+          <a:blip r:embed="rId8" cstate="print"/>
+          <a:srcRect/>
+          <a:stretch>
+            <a:fillRect/>
+          </a:stretch>
+        </p:blipFill>
+        <p:spPr bwMode="auto">
+          <a:xfrm>
+            <a:off x="0" y="6215058"/>
+            <a:ext cx="1070774" cy="642942"/>
+          </a:xfrm>
+          <a:prstGeom prst="rect">
+            <a:avLst/>
+          </a:prstGeom>
+          <a:noFill/>
+        </p:spPr>
+      </p:pic>
+      <p:pic>
+        <p:nvPicPr>
+          <p:cNvPr id="11" name="10 Imagen" descr="blanco_sangre.jpg"/>
+          <p:cNvPicPr>
+            <a:picLocks noChangeAspect="1"/>
+          </p:cNvPicPr>
+          <p:nvPr/>
+        </p:nvPicPr>
+        <p:blipFill>
+          <a:blip r:embed="rId9"/>
+          <a:srcRect l="60600" t="6169" r="14374" b="37509"/>
+          <a:stretch>
+            <a:fillRect/>
+          </a:stretch>
+        </p:blipFill>
+        <p:spPr>
+          <a:xfrm>
+            <a:off x="7000892" y="244943"/>
+            <a:ext cx="1643074" cy="1898173"/>
           </a:xfrm>
           <a:prstGeom prst="rect">
             <a:avLst/>
@@ -22686,7 +22665,7 @@
 </p:sld>
 </file>
 
-<file path=ppt/slides/slide16.xml><?xml version="1.0" encoding="utf-8"?>
+<file path=ppt/slides/slide15.xml><?xml version="1.0" encoding="utf-8"?>
 <p:sld xmlns:a="http://schemas.openxmlformats.org/drawingml/2006/main" xmlns:r="http://schemas.openxmlformats.org/officeDocument/2006/relationships" xmlns:p="http://schemas.openxmlformats.org/presentationml/2006/main">
   <p:cSld>
     <p:spTree>
@@ -22713,7 +22692,7 @@
         </p:nvSpPr>
         <p:spPr bwMode="auto">
           <a:xfrm>
-            <a:off x="6141099" y="504825"/>
+            <a:off x="6643702" y="504825"/>
             <a:ext cx="1217000" cy="446276"/>
           </a:xfrm>
           <a:prstGeom prst="rect">
@@ -22801,32 +22780,6 @@
           </a:p>
         </p:txBody>
       </p:sp>
-      <p:pic>
-        <p:nvPicPr>
-          <p:cNvPr id="8" name="Picture 2" descr="http://www.stockwatch.in/files/Procter-Gamble.bmp"/>
-          <p:cNvPicPr>
-            <a:picLocks noChangeAspect="1" noChangeArrowheads="1"/>
-          </p:cNvPicPr>
-          <p:nvPr/>
-        </p:nvPicPr>
-        <p:blipFill>
-          <a:blip r:embed="rId3" cstate="print"/>
-          <a:srcRect/>
-          <a:stretch>
-            <a:fillRect/>
-          </a:stretch>
-        </p:blipFill>
-        <p:spPr bwMode="auto">
-          <a:xfrm>
-            <a:off x="-32" y="-24"/>
-            <a:ext cx="1070774" cy="642942"/>
-          </a:xfrm>
-          <a:prstGeom prst="rect">
-            <a:avLst/>
-          </a:prstGeom>
-          <a:noFill/>
-        </p:spPr>
-      </p:pic>
       <p:sp>
         <p:nvSpPr>
           <p:cNvPr id="9" name="8 Rectángulo"/>
@@ -22888,7 +22841,7 @@
           <p:nvPr/>
         </p:nvPicPr>
         <p:blipFill>
-          <a:blip r:embed="rId4" cstate="print"/>
+          <a:blip r:embed="rId3" cstate="print"/>
           <a:stretch>
             <a:fillRect/>
           </a:stretch>
@@ -22912,7 +22865,58 @@
           <p:nvPr/>
         </p:nvPicPr>
         <p:blipFill>
+          <a:blip r:embed="rId4"/>
+          <a:srcRect b="21830"/>
+          <a:stretch>
+            <a:fillRect/>
+          </a:stretch>
+        </p:blipFill>
+        <p:spPr bwMode="auto">
+          <a:xfrm>
+            <a:off x="195293" y="2571744"/>
+            <a:ext cx="8734425" cy="3286148"/>
+          </a:xfrm>
+          <a:prstGeom prst="rect">
+            <a:avLst/>
+          </a:prstGeom>
+          <a:noFill/>
+        </p:spPr>
+      </p:pic>
+      <p:pic>
+        <p:nvPicPr>
+          <p:cNvPr id="11" name="10 Imagen" descr="blanco_sangre.jpg"/>
+          <p:cNvPicPr>
+            <a:picLocks noChangeAspect="1"/>
+          </p:cNvPicPr>
+          <p:nvPr/>
+        </p:nvPicPr>
+        <p:blipFill>
           <a:blip r:embed="rId5"/>
+          <a:srcRect l="59376" t="6169" r="14374" b="35389"/>
+          <a:stretch>
+            <a:fillRect/>
+          </a:stretch>
+        </p:blipFill>
+        <p:spPr>
+          <a:xfrm>
+            <a:off x="7786742" y="244943"/>
+            <a:ext cx="785786" cy="898041"/>
+          </a:xfrm>
+          <a:prstGeom prst="rect">
+            <a:avLst/>
+          </a:prstGeom>
+        </p:spPr>
+      </p:pic>
+      <p:pic>
+        <p:nvPicPr>
+          <p:cNvPr id="8" name="Picture 2" descr="http://www.stockwatch.in/files/Procter-Gamble.bmp"/>
+          <p:cNvPicPr>
+            <a:picLocks noChangeAspect="1" noChangeArrowheads="1"/>
+          </p:cNvPicPr>
+          <p:nvPr/>
+        </p:nvPicPr>
+        <p:blipFill>
+          <a:blip r:embed="rId6" cstate="print"/>
           <a:srcRect/>
           <a:stretch>
             <a:fillRect/>
@@ -22920,8 +22924,8 @@
         </p:blipFill>
         <p:spPr bwMode="auto">
           <a:xfrm>
-            <a:off x="195293" y="2571744"/>
-            <a:ext cx="8734425" cy="3381375"/>
+            <a:off x="0" y="6215058"/>
+            <a:ext cx="1070774" cy="642942"/>
           </a:xfrm>
           <a:prstGeom prst="rect">
             <a:avLst/>
@@ -22944,7 +22948,7 @@
 </p:sld>
 </file>
 
-<file path=ppt/slides/slide17.xml><?xml version="1.0" encoding="utf-8"?>
+<file path=ppt/slides/slide16.xml><?xml version="1.0" encoding="utf-8"?>
 <p:sld xmlns:a="http://schemas.openxmlformats.org/drawingml/2006/main" xmlns:r="http://schemas.openxmlformats.org/officeDocument/2006/relationships" xmlns:p="http://schemas.openxmlformats.org/presentationml/2006/main">
   <p:cSld>
     <p:spTree>
@@ -22971,7 +22975,7 @@
         </p:nvSpPr>
         <p:spPr bwMode="auto">
           <a:xfrm>
-            <a:off x="5802873" y="504825"/>
+            <a:off x="6286512" y="504825"/>
             <a:ext cx="1555234" cy="446276"/>
           </a:xfrm>
           <a:prstGeom prst="rect">
@@ -23010,32 +23014,6 @@
           </a:p>
         </p:txBody>
       </p:sp>
-      <p:pic>
-        <p:nvPicPr>
-          <p:cNvPr id="7" name="Picture 2" descr="http://www.stockwatch.in/files/Procter-Gamble.bmp"/>
-          <p:cNvPicPr>
-            <a:picLocks noChangeAspect="1" noChangeArrowheads="1"/>
-          </p:cNvPicPr>
-          <p:nvPr/>
-        </p:nvPicPr>
-        <p:blipFill>
-          <a:blip r:embed="rId3" cstate="print"/>
-          <a:srcRect/>
-          <a:stretch>
-            <a:fillRect/>
-          </a:stretch>
-        </p:blipFill>
-        <p:spPr bwMode="auto">
-          <a:xfrm>
-            <a:off x="-32" y="-24"/>
-            <a:ext cx="1070774" cy="642942"/>
-          </a:xfrm>
-          <a:prstGeom prst="rect">
-            <a:avLst/>
-          </a:prstGeom>
-          <a:noFill/>
-        </p:spPr>
-      </p:pic>
       <p:sp>
         <p:nvSpPr>
           <p:cNvPr id="8" name="7 Rectángulo"/>
@@ -23097,7 +23075,7 @@
           <p:nvPr/>
         </p:nvPicPr>
         <p:blipFill>
-          <a:blip r:embed="rId4" cstate="print"/>
+          <a:blip r:embed="rId3" cstate="print"/>
           <a:stretch>
             <a:fillRect/>
           </a:stretch>
@@ -23121,7 +23099,7 @@
           <p:nvPr/>
         </p:nvPicPr>
         <p:blipFill>
-          <a:blip r:embed="rId5"/>
+          <a:blip r:embed="rId4"/>
           <a:srcRect/>
           <a:stretch>
             <a:fillRect/>
@@ -23129,8 +23107,8 @@
         </p:blipFill>
         <p:spPr bwMode="auto">
           <a:xfrm>
-            <a:off x="1428728" y="1071546"/>
-            <a:ext cx="6867524" cy="4771836"/>
+            <a:off x="571472" y="1857364"/>
+            <a:ext cx="7724780" cy="4357718"/>
           </a:xfrm>
           <a:prstGeom prst="rect">
             <a:avLst/>
@@ -23138,6 +23116,106 @@
           <a:noFill/>
         </p:spPr>
       </p:pic>
+      <p:pic>
+        <p:nvPicPr>
+          <p:cNvPr id="10" name="9 Imagen" descr="blanco_sangre.jpg"/>
+          <p:cNvPicPr>
+            <a:picLocks noChangeAspect="1"/>
+          </p:cNvPicPr>
+          <p:nvPr/>
+        </p:nvPicPr>
+        <p:blipFill>
+          <a:blip r:embed="rId5"/>
+          <a:srcRect l="59376" t="6169" r="14374" b="35389"/>
+          <a:stretch>
+            <a:fillRect/>
+          </a:stretch>
+        </p:blipFill>
+        <p:spPr>
+          <a:xfrm>
+            <a:off x="7786742" y="244943"/>
+            <a:ext cx="785786" cy="898041"/>
+          </a:xfrm>
+          <a:prstGeom prst="rect">
+            <a:avLst/>
+          </a:prstGeom>
+        </p:spPr>
+      </p:pic>
+      <p:pic>
+        <p:nvPicPr>
+          <p:cNvPr id="7" name="Picture 2" descr="http://www.stockwatch.in/files/Procter-Gamble.bmp"/>
+          <p:cNvPicPr>
+            <a:picLocks noChangeAspect="1" noChangeArrowheads="1"/>
+          </p:cNvPicPr>
+          <p:nvPr/>
+        </p:nvPicPr>
+        <p:blipFill>
+          <a:blip r:embed="rId6" cstate="print"/>
+          <a:srcRect/>
+          <a:stretch>
+            <a:fillRect/>
+          </a:stretch>
+        </p:blipFill>
+        <p:spPr bwMode="auto">
+          <a:xfrm>
+            <a:off x="0" y="6215058"/>
+            <a:ext cx="1070774" cy="642942"/>
+          </a:xfrm>
+          <a:prstGeom prst="rect">
+            <a:avLst/>
+          </a:prstGeom>
+          <a:noFill/>
+        </p:spPr>
+      </p:pic>
+      <p:sp>
+        <p:nvSpPr>
+          <p:cNvPr id="11" name="CuadroTexto 5"/>
+          <p:cNvSpPr txBox="1">
+            <a:spLocks noChangeArrowheads="1"/>
+          </p:cNvSpPr>
+          <p:nvPr/>
+        </p:nvSpPr>
+        <p:spPr bwMode="auto">
+          <a:xfrm>
+            <a:off x="357158" y="1142984"/>
+            <a:ext cx="8286780" cy="584775"/>
+          </a:xfrm>
+          <a:prstGeom prst="rect">
+            <a:avLst/>
+          </a:prstGeom>
+          <a:noFill/>
+          <a:ln w="9525">
+            <a:noFill/>
+            <a:miter lim="800000"/>
+            <a:headEnd/>
+            <a:tailEnd/>
+          </a:ln>
+        </p:spPr>
+        <p:txBody>
+          <a:bodyPr wrap="square">
+            <a:spAutoFit/>
+          </a:bodyPr>
+          <a:lstStyle/>
+          <a:p>
+            <a:pPr algn="just"/>
+            <a:r>
+              <a:rPr lang="es-MX" sz="1600" dirty="0" smtClean="0">
+                <a:solidFill>
+                  <a:srgbClr val="235397"/>
+                </a:solidFill>
+                <a:latin typeface="Century Gothic" pitchFamily="34" charset="0"/>
+              </a:rPr>
+              <a:t>En este apartado es donde nivel 0 agrega sus comentarios y acepta o rechaza el cambio.</a:t>
+            </a:r>
+            <a:endParaRPr lang="es-MX" sz="1600" dirty="0">
+              <a:solidFill>
+                <a:srgbClr val="235397"/>
+              </a:solidFill>
+              <a:latin typeface="Century Gothic" pitchFamily="34" charset="0"/>
+            </a:endParaRPr>
+          </a:p>
+        </p:txBody>
+      </p:sp>
     </p:spTree>
   </p:cSld>
   <p:clrMapOvr>
@@ -23153,7 +23231,7 @@
 </p:sld>
 </file>
 
-<file path=ppt/slides/slide18.xml><?xml version="1.0" encoding="utf-8"?>
+<file path=ppt/slides/slide17.xml><?xml version="1.0" encoding="utf-8"?>
 <p:sld xmlns:a="http://schemas.openxmlformats.org/drawingml/2006/main" xmlns:r="http://schemas.openxmlformats.org/officeDocument/2006/relationships" xmlns:p="http://schemas.openxmlformats.org/presentationml/2006/main">
   <p:cSld>
     <p:spTree>
@@ -23180,7 +23258,7 @@
         </p:nvSpPr>
         <p:spPr bwMode="auto">
           <a:xfrm>
-            <a:off x="5774028" y="504825"/>
+            <a:off x="6274060" y="500042"/>
             <a:ext cx="1584088" cy="446276"/>
           </a:xfrm>
           <a:prstGeom prst="rect">
@@ -23219,32 +23297,6 @@
           </a:p>
         </p:txBody>
       </p:sp>
-      <p:pic>
-        <p:nvPicPr>
-          <p:cNvPr id="7" name="Picture 2" descr="http://www.stockwatch.in/files/Procter-Gamble.bmp"/>
-          <p:cNvPicPr>
-            <a:picLocks noChangeAspect="1" noChangeArrowheads="1"/>
-          </p:cNvPicPr>
-          <p:nvPr/>
-        </p:nvPicPr>
-        <p:blipFill>
-          <a:blip r:embed="rId3" cstate="print"/>
-          <a:srcRect/>
-          <a:stretch>
-            <a:fillRect/>
-          </a:stretch>
-        </p:blipFill>
-        <p:spPr bwMode="auto">
-          <a:xfrm>
-            <a:off x="-32" y="-24"/>
-            <a:ext cx="1070774" cy="642942"/>
-          </a:xfrm>
-          <a:prstGeom prst="rect">
-            <a:avLst/>
-          </a:prstGeom>
-          <a:noFill/>
-        </p:spPr>
-      </p:pic>
       <p:sp>
         <p:nvSpPr>
           <p:cNvPr id="8" name="7 Rectángulo"/>
@@ -23306,7 +23358,7 @@
           <p:nvPr/>
         </p:nvPicPr>
         <p:blipFill>
-          <a:blip r:embed="rId4" cstate="print"/>
+          <a:blip r:embed="rId3" cstate="print"/>
           <a:stretch>
             <a:fillRect/>
           </a:stretch>
@@ -23330,7 +23382,7 @@
           <p:nvPr/>
         </p:nvPicPr>
         <p:blipFill>
-          <a:blip r:embed="rId5"/>
+          <a:blip r:embed="rId4"/>
           <a:srcRect/>
           <a:stretch>
             <a:fillRect/>
@@ -23338,8 +23390,8 @@
         </p:blipFill>
         <p:spPr bwMode="auto">
           <a:xfrm>
-            <a:off x="714348" y="1000108"/>
-            <a:ext cx="7358082" cy="5072098"/>
+            <a:off x="714348" y="1928802"/>
+            <a:ext cx="7929618" cy="4143404"/>
           </a:xfrm>
           <a:prstGeom prst="rect">
             <a:avLst/>
@@ -23347,6 +23399,106 @@
           <a:noFill/>
         </p:spPr>
       </p:pic>
+      <p:pic>
+        <p:nvPicPr>
+          <p:cNvPr id="10" name="9 Imagen" descr="blanco_sangre.jpg"/>
+          <p:cNvPicPr>
+            <a:picLocks noChangeAspect="1"/>
+          </p:cNvPicPr>
+          <p:nvPr/>
+        </p:nvPicPr>
+        <p:blipFill>
+          <a:blip r:embed="rId5"/>
+          <a:srcRect l="59376" t="6169" r="14374" b="35389"/>
+          <a:stretch>
+            <a:fillRect/>
+          </a:stretch>
+        </p:blipFill>
+        <p:spPr>
+          <a:xfrm>
+            <a:off x="7786742" y="244943"/>
+            <a:ext cx="785786" cy="898041"/>
+          </a:xfrm>
+          <a:prstGeom prst="rect">
+            <a:avLst/>
+          </a:prstGeom>
+        </p:spPr>
+      </p:pic>
+      <p:pic>
+        <p:nvPicPr>
+          <p:cNvPr id="7" name="Picture 2" descr="http://www.stockwatch.in/files/Procter-Gamble.bmp"/>
+          <p:cNvPicPr>
+            <a:picLocks noChangeAspect="1" noChangeArrowheads="1"/>
+          </p:cNvPicPr>
+          <p:nvPr/>
+        </p:nvPicPr>
+        <p:blipFill>
+          <a:blip r:embed="rId6" cstate="print"/>
+          <a:srcRect/>
+          <a:stretch>
+            <a:fillRect/>
+          </a:stretch>
+        </p:blipFill>
+        <p:spPr bwMode="auto">
+          <a:xfrm>
+            <a:off x="0" y="6215058"/>
+            <a:ext cx="1070774" cy="642942"/>
+          </a:xfrm>
+          <a:prstGeom prst="rect">
+            <a:avLst/>
+          </a:prstGeom>
+          <a:noFill/>
+        </p:spPr>
+      </p:pic>
+      <p:sp>
+        <p:nvSpPr>
+          <p:cNvPr id="11" name="CuadroTexto 5"/>
+          <p:cNvSpPr txBox="1">
+            <a:spLocks noChangeArrowheads="1"/>
+          </p:cNvSpPr>
+          <p:nvPr/>
+        </p:nvSpPr>
+        <p:spPr bwMode="auto">
+          <a:xfrm>
+            <a:off x="357158" y="1285860"/>
+            <a:ext cx="8286780" cy="584775"/>
+          </a:xfrm>
+          <a:prstGeom prst="rect">
+            <a:avLst/>
+          </a:prstGeom>
+          <a:noFill/>
+          <a:ln w="9525">
+            <a:noFill/>
+            <a:miter lim="800000"/>
+            <a:headEnd/>
+            <a:tailEnd/>
+          </a:ln>
+        </p:spPr>
+        <p:txBody>
+          <a:bodyPr wrap="square">
+            <a:spAutoFit/>
+          </a:bodyPr>
+          <a:lstStyle/>
+          <a:p>
+            <a:pPr algn="just"/>
+            <a:r>
+              <a:rPr lang="es-MX" sz="1600" dirty="0" smtClean="0">
+                <a:solidFill>
+                  <a:srgbClr val="235397"/>
+                </a:solidFill>
+                <a:latin typeface="Century Gothic" pitchFamily="34" charset="0"/>
+              </a:rPr>
+              <a:t>En este apartado se pueden ver todos los cambios que se han autorizado o rechazado y sus detalles</a:t>
+            </a:r>
+            <a:endParaRPr lang="es-MX" sz="1600" dirty="0">
+              <a:solidFill>
+                <a:srgbClr val="235397"/>
+              </a:solidFill>
+              <a:latin typeface="Century Gothic" pitchFamily="34" charset="0"/>
+            </a:endParaRPr>
+          </a:p>
+        </p:txBody>
+      </p:sp>
     </p:spTree>
   </p:cSld>
   <p:clrMapOvr>
@@ -23362,7 +23514,7 @@
 </p:sld>
 </file>
 
-<file path=ppt/slides/slide19.xml><?xml version="1.0" encoding="utf-8"?>
+<file path=ppt/slides/slide18.xml><?xml version="1.0" encoding="utf-8"?>
 <p:sld xmlns:a="http://schemas.openxmlformats.org/drawingml/2006/main" xmlns:r="http://schemas.openxmlformats.org/officeDocument/2006/relationships" xmlns:p="http://schemas.openxmlformats.org/presentationml/2006/main">
   <p:cSld>
     <p:spTree>
@@ -23471,6 +23623,57 @@
           </a:prstGeom>
         </p:spPr>
       </p:pic>
+      <p:pic>
+        <p:nvPicPr>
+          <p:cNvPr id="5" name="Picture 2" descr="http://www.stockwatch.in/files/Procter-Gamble.bmp"/>
+          <p:cNvPicPr>
+            <a:picLocks noChangeAspect="1" noChangeArrowheads="1"/>
+          </p:cNvPicPr>
+          <p:nvPr/>
+        </p:nvPicPr>
+        <p:blipFill>
+          <a:blip r:embed="rId8" cstate="print"/>
+          <a:srcRect/>
+          <a:stretch>
+            <a:fillRect/>
+          </a:stretch>
+        </p:blipFill>
+        <p:spPr bwMode="auto">
+          <a:xfrm>
+            <a:off x="0" y="6215058"/>
+            <a:ext cx="1070774" cy="642942"/>
+          </a:xfrm>
+          <a:prstGeom prst="rect">
+            <a:avLst/>
+          </a:prstGeom>
+          <a:noFill/>
+        </p:spPr>
+      </p:pic>
+      <p:pic>
+        <p:nvPicPr>
+          <p:cNvPr id="10" name="9 Imagen" descr="blanco_sangre.jpg"/>
+          <p:cNvPicPr>
+            <a:picLocks noChangeAspect="1"/>
+          </p:cNvPicPr>
+          <p:nvPr/>
+        </p:nvPicPr>
+        <p:blipFill>
+          <a:blip r:embed="rId9"/>
+          <a:srcRect l="60600" t="6169" r="14374" b="37509"/>
+          <a:stretch>
+            <a:fillRect/>
+          </a:stretch>
+        </p:blipFill>
+        <p:spPr>
+          <a:xfrm>
+            <a:off x="7000892" y="244943"/>
+            <a:ext cx="1643074" cy="1898173"/>
+          </a:xfrm>
+          <a:prstGeom prst="rect">
+            <a:avLst/>
+          </a:prstGeom>
+        </p:spPr>
+      </p:pic>
     </p:spTree>
   </p:cSld>
   <p:clrMapOvr>
@@ -23486,137 +23689,7 @@
 </p:sld>
 </file>
 
-<file path=ppt/slides/slide2.xml><?xml version="1.0" encoding="utf-8"?>
-<p:sld xmlns:a="http://schemas.openxmlformats.org/drawingml/2006/main" xmlns:r="http://schemas.openxmlformats.org/officeDocument/2006/relationships" xmlns:p="http://schemas.openxmlformats.org/presentationml/2006/main">
-  <p:cSld>
-    <p:spTree>
-      <p:nvGrpSpPr>
-        <p:cNvPr id="1" name=""/>
-        <p:cNvGrpSpPr/>
-        <p:nvPr/>
-      </p:nvGrpSpPr>
-      <p:grpSpPr>
-        <a:xfrm>
-          <a:off x="0" y="0"/>
-          <a:ext cx="0" cy="0"/>
-          <a:chOff x="0" y="0"/>
-          <a:chExt cx="0" cy="0"/>
-        </a:xfrm>
-      </p:grpSpPr>
-      <p:pic>
-        <p:nvPicPr>
-          <p:cNvPr id="7" name="6 Imagen" descr="logo-borrego3.jpg"/>
-          <p:cNvPicPr>
-            <a:picLocks noChangeAspect="1"/>
-          </p:cNvPicPr>
-          <p:nvPr/>
-        </p:nvPicPr>
-        <p:blipFill>
-          <a:blip r:embed="rId3">
-            <a:lum bright="40000" contrast="-44000"/>
-          </a:blip>
-          <a:stretch>
-            <a:fillRect/>
-          </a:stretch>
-        </p:blipFill>
-        <p:spPr>
-          <a:xfrm>
-            <a:off x="1928794" y="995980"/>
-            <a:ext cx="5214974" cy="4331961"/>
-          </a:xfrm>
-          <a:prstGeom prst="rect">
-            <a:avLst/>
-          </a:prstGeom>
-        </p:spPr>
-      </p:pic>
-      <p:sp>
-        <p:nvSpPr>
-          <p:cNvPr id="8" name="7 Título"/>
-          <p:cNvSpPr>
-            <a:spLocks noGrp="1"/>
-          </p:cNvSpPr>
-          <p:nvPr>
-            <p:ph type="ctrTitle"/>
-          </p:nvPr>
-        </p:nvSpPr>
-        <p:spPr/>
-        <p:txBody>
-          <a:bodyPr/>
-          <a:lstStyle/>
-          <a:p>
-            <a:r>
-              <a:rPr lang="es-MX" b="1" dirty="0" smtClean="0">
-                <a:latin typeface="Century Gothic" pitchFamily="34" charset="0"/>
-              </a:rPr>
-              <a:t>PROCTER &amp; </a:t>
-            </a:r>
-            <a:r>
-              <a:rPr lang="es-MX" b="1" dirty="0" smtClean="0">
-                <a:latin typeface="Century Gothic" pitchFamily="34" charset="0"/>
-              </a:rPr>
-              <a:t>GAMBLE</a:t>
-            </a:r>
-            <a:endParaRPr lang="es-MX" b="1" dirty="0">
-              <a:latin typeface="Century Gothic" pitchFamily="34" charset="0"/>
-            </a:endParaRPr>
-          </a:p>
-        </p:txBody>
-      </p:sp>
-      <p:sp>
-        <p:nvSpPr>
-          <p:cNvPr id="9" name="8 Subtítulo"/>
-          <p:cNvSpPr>
-            <a:spLocks noGrp="1"/>
-          </p:cNvSpPr>
-          <p:nvPr>
-            <p:ph type="subTitle" idx="1"/>
-          </p:nvPr>
-        </p:nvSpPr>
-        <p:spPr/>
-        <p:txBody>
-          <a:bodyPr/>
-          <a:lstStyle/>
-          <a:p>
-            <a:r>
-              <a:rPr lang="es-MX" dirty="0" smtClean="0">
-                <a:solidFill>
-                  <a:schemeClr val="tx1">
-                    <a:lumMod val="85000"/>
-                    <a:lumOff val="15000"/>
-                  </a:schemeClr>
-                </a:solidFill>
-                <a:latin typeface="Century Gothic" pitchFamily="34" charset="0"/>
-              </a:rPr>
-              <a:t>Sistema de control de cambios</a:t>
-            </a:r>
-            <a:endParaRPr lang="es-MX" dirty="0">
-              <a:solidFill>
-                <a:schemeClr val="tx1">
-                  <a:lumMod val="85000"/>
-                  <a:lumOff val="15000"/>
-                </a:schemeClr>
-              </a:solidFill>
-              <a:latin typeface="Century Gothic" pitchFamily="34" charset="0"/>
-            </a:endParaRPr>
-          </a:p>
-        </p:txBody>
-      </p:sp>
-    </p:spTree>
-  </p:cSld>
-  <p:clrMapOvr>
-    <a:masterClrMapping/>
-  </p:clrMapOvr>
-  <p:timing>
-    <p:tnLst>
-      <p:par>
-        <p:cTn id="1" dur="indefinite" restart="never" nodeType="tmRoot"/>
-      </p:par>
-    </p:tnLst>
-  </p:timing>
-</p:sld>
-</file>
-
-<file path=ppt/slides/slide20.xml><?xml version="1.0" encoding="utf-8"?>
+<file path=ppt/slides/slide19.xml><?xml version="1.0" encoding="utf-8"?>
 <p:sld xmlns:a="http://schemas.openxmlformats.org/drawingml/2006/main" xmlns:r="http://schemas.openxmlformats.org/officeDocument/2006/relationships" xmlns:p="http://schemas.openxmlformats.org/presentationml/2006/main">
   <p:cSld>
     <p:spTree>
@@ -23643,7 +23716,7 @@
         </p:nvSpPr>
         <p:spPr bwMode="auto">
           <a:xfrm>
-            <a:off x="6141101" y="504825"/>
+            <a:off x="6712586" y="504825"/>
             <a:ext cx="1217000" cy="446276"/>
           </a:xfrm>
           <a:prstGeom prst="rect">
@@ -23731,32 +23804,6 @@
           </a:p>
         </p:txBody>
       </p:sp>
-      <p:pic>
-        <p:nvPicPr>
-          <p:cNvPr id="8" name="Picture 2" descr="http://www.stockwatch.in/files/Procter-Gamble.bmp"/>
-          <p:cNvPicPr>
-            <a:picLocks noChangeAspect="1" noChangeArrowheads="1"/>
-          </p:cNvPicPr>
-          <p:nvPr/>
-        </p:nvPicPr>
-        <p:blipFill>
-          <a:blip r:embed="rId3" cstate="print"/>
-          <a:srcRect/>
-          <a:stretch>
-            <a:fillRect/>
-          </a:stretch>
-        </p:blipFill>
-        <p:spPr bwMode="auto">
-          <a:xfrm>
-            <a:off x="-32" y="-24"/>
-            <a:ext cx="1070774" cy="642942"/>
-          </a:xfrm>
-          <a:prstGeom prst="rect">
-            <a:avLst/>
-          </a:prstGeom>
-          <a:noFill/>
-        </p:spPr>
-      </p:pic>
       <p:sp>
         <p:nvSpPr>
           <p:cNvPr id="9" name="8 Rectángulo"/>
@@ -23818,7 +23865,7 @@
           <p:nvPr/>
         </p:nvPicPr>
         <p:blipFill>
-          <a:blip r:embed="rId4" cstate="print"/>
+          <a:blip r:embed="rId3" cstate="print"/>
           <a:stretch>
             <a:fillRect/>
           </a:stretch>
@@ -23842,7 +23889,7 @@
           <p:nvPr/>
         </p:nvPicPr>
         <p:blipFill>
-          <a:blip r:embed="rId5"/>
+          <a:blip r:embed="rId4"/>
           <a:srcRect/>
           <a:stretch>
             <a:fillRect/>
@@ -23857,6 +23904,57 @@
             <a:avLst/>
           </a:prstGeom>
           <a:noFill/>
+        </p:spPr>
+      </p:pic>
+      <p:pic>
+        <p:nvPicPr>
+          <p:cNvPr id="8" name="Picture 2" descr="http://www.stockwatch.in/files/Procter-Gamble.bmp"/>
+          <p:cNvPicPr>
+            <a:picLocks noChangeAspect="1" noChangeArrowheads="1"/>
+          </p:cNvPicPr>
+          <p:nvPr/>
+        </p:nvPicPr>
+        <p:blipFill>
+          <a:blip r:embed="rId5" cstate="print"/>
+          <a:srcRect/>
+          <a:stretch>
+            <a:fillRect/>
+          </a:stretch>
+        </p:blipFill>
+        <p:spPr bwMode="auto">
+          <a:xfrm>
+            <a:off x="0" y="6215058"/>
+            <a:ext cx="1070774" cy="642942"/>
+          </a:xfrm>
+          <a:prstGeom prst="rect">
+            <a:avLst/>
+          </a:prstGeom>
+          <a:noFill/>
+        </p:spPr>
+      </p:pic>
+      <p:pic>
+        <p:nvPicPr>
+          <p:cNvPr id="11" name="10 Imagen" descr="blanco_sangre.jpg"/>
+          <p:cNvPicPr>
+            <a:picLocks noChangeAspect="1"/>
+          </p:cNvPicPr>
+          <p:nvPr/>
+        </p:nvPicPr>
+        <p:blipFill>
+          <a:blip r:embed="rId6"/>
+          <a:srcRect l="59376" t="6169" r="14374" b="35389"/>
+          <a:stretch>
+            <a:fillRect/>
+          </a:stretch>
+        </p:blipFill>
+        <p:spPr>
+          <a:xfrm>
+            <a:off x="7786742" y="244943"/>
+            <a:ext cx="785786" cy="898041"/>
+          </a:xfrm>
+          <a:prstGeom prst="rect">
+            <a:avLst/>
+          </a:prstGeom>
         </p:spPr>
       </p:pic>
     </p:spTree>
@@ -23874,7 +23972,7 @@
 </p:sld>
 </file>
 
-<file path=ppt/slides/slide21.xml><?xml version="1.0" encoding="utf-8"?>
+<file path=ppt/slides/slide2.xml><?xml version="1.0" encoding="utf-8"?>
 <p:sld xmlns:a="http://schemas.openxmlformats.org/drawingml/2006/main" xmlns:r="http://schemas.openxmlformats.org/officeDocument/2006/relationships" xmlns:p="http://schemas.openxmlformats.org/presentationml/2006/main">
   <p:cSld>
     <p:spTree>
@@ -23901,8 +23999,8 @@
         </p:nvSpPr>
         <p:spPr bwMode="auto">
           <a:xfrm>
-            <a:off x="5802873" y="504825"/>
-            <a:ext cx="1555234" cy="446276"/>
+            <a:off x="5376886" y="504825"/>
+            <a:ext cx="2481262" cy="446088"/>
           </a:xfrm>
           <a:prstGeom prst="rect">
             <a:avLst/>
@@ -23923,49 +24021,87 @@
           <a:p>
             <a:pPr algn="r"/>
             <a:r>
-              <a:rPr lang="es-ES_tradnl" sz="2300" dirty="0" smtClean="0">
+              <a:rPr lang="es-ES_tradnl" sz="2300" dirty="0">
                 <a:solidFill>
                   <a:srgbClr val="929396"/>
                 </a:solidFill>
                 <a:latin typeface="Century Gothic" pitchFamily="34" charset="0"/>
               </a:rPr>
-              <a:t>CAMBIOS</a:t>
+              <a:t>PROBLEMÁTICA</a:t>
             </a:r>
-            <a:endParaRPr lang="es-ES_tradnl" sz="2300" dirty="0">
+          </a:p>
+        </p:txBody>
+      </p:sp>
+      <p:sp>
+        <p:nvSpPr>
+          <p:cNvPr id="6" name="CuadroTexto 5"/>
+          <p:cNvSpPr txBox="1">
+            <a:spLocks noChangeArrowheads="1"/>
+          </p:cNvSpPr>
+          <p:nvPr/>
+        </p:nvSpPr>
+        <p:spPr bwMode="auto">
+          <a:xfrm>
+            <a:off x="381000" y="1957037"/>
+            <a:ext cx="8262938" cy="2554545"/>
+          </a:xfrm>
+          <a:prstGeom prst="rect">
+            <a:avLst/>
+          </a:prstGeom>
+          <a:noFill/>
+          <a:ln w="9525">
+            <a:noFill/>
+            <a:miter lim="800000"/>
+            <a:headEnd/>
+            <a:tailEnd/>
+          </a:ln>
+        </p:spPr>
+        <p:txBody>
+          <a:bodyPr>
+            <a:spAutoFit/>
+          </a:bodyPr>
+          <a:lstStyle/>
+          <a:p>
+            <a:pPr algn="just"/>
+            <a:r>
+              <a:rPr lang="es-MX" sz="1600" dirty="0" smtClean="0">
+                <a:solidFill>
+                  <a:srgbClr val="235397"/>
+                </a:solidFill>
+                <a:latin typeface="Century Gothic" pitchFamily="34" charset="0"/>
+              </a:rPr>
+              <a:t>El tiempo en un proceso de control de cambios tiene un gran impacto en la planta industrial, hablando en cuanto a economía, por ende es necesario optimizar los tiempos de dicho proceso y evitar que por un retraso o falta de cambio haya pérdidas económicas para la planta.</a:t>
+            </a:r>
+          </a:p>
+          <a:p>
+            <a:pPr algn="just"/>
+            <a:endParaRPr lang="es-MX" sz="1600" dirty="0" smtClean="0">
               <a:solidFill>
-                <a:srgbClr val="929396"/>
+                <a:srgbClr val="235397"/>
+              </a:solidFill>
+              <a:latin typeface="Century Gothic" pitchFamily="34" charset="0"/>
+            </a:endParaRPr>
+          </a:p>
+          <a:p>
+            <a:pPr algn="just"/>
+            <a:r>
+              <a:rPr lang="es-MX" sz="1600" dirty="0" smtClean="0">
+                <a:solidFill>
+                  <a:srgbClr val="235397"/>
+                </a:solidFill>
+                <a:latin typeface="Century Gothic" pitchFamily="34" charset="0"/>
+              </a:rPr>
+              <a:t>Actualmente cada vez que se desea hacer un cambio, suele tardar mucho tiempo en ser procesado y aceptado. Además en muchas ocasiones, las personas encargadas de autorizar dichos cambios dejan de lado éstos, por lo que se van acumulando y por consecuencia la aprobación de los cambios llegan a retrasarse por varios días o en el peor de los casos no se realizan.</a:t>
+            </a:r>
+            <a:endParaRPr lang="es-MX" sz="1600" dirty="0">
+              <a:solidFill>
+                <a:srgbClr val="235397"/>
               </a:solidFill>
               <a:latin typeface="Century Gothic" pitchFamily="34" charset="0"/>
             </a:endParaRPr>
           </a:p>
         </p:txBody>
       </p:sp>
-      <p:pic>
-        <p:nvPicPr>
-          <p:cNvPr id="7" name="Picture 2" descr="http://www.stockwatch.in/files/Procter-Gamble.bmp"/>
-          <p:cNvPicPr>
-            <a:picLocks noChangeAspect="1" noChangeArrowheads="1"/>
-          </p:cNvPicPr>
-          <p:nvPr/>
-        </p:nvPicPr>
-        <p:blipFill>
-          <a:blip r:embed="rId3" cstate="print"/>
-          <a:srcRect/>
-          <a:stretch>
-            <a:fillRect/>
-          </a:stretch>
-        </p:blipFill>
-        <p:spPr bwMode="auto">
-          <a:xfrm>
-            <a:off x="-32" y="-24"/>
-            <a:ext cx="1070774" cy="642942"/>
-          </a:xfrm>
-          <a:prstGeom prst="rect">
-            <a:avLst/>
-          </a:prstGeom>
-          <a:noFill/>
-        </p:spPr>
-      </p:pic>
       <p:sp>
         <p:nvSpPr>
           <p:cNvPr id="8" name="7 Rectángulo"/>
@@ -24027,7 +24163,215 @@
           <p:nvPr/>
         </p:nvPicPr>
         <p:blipFill>
-          <a:blip r:embed="rId4" cstate="print"/>
+          <a:blip r:embed="rId3" cstate="print"/>
+          <a:stretch>
+            <a:fillRect/>
+          </a:stretch>
+        </p:blipFill>
+        <p:spPr>
+          <a:xfrm>
+            <a:off x="7537561" y="6200801"/>
+            <a:ext cx="1606471" cy="585785"/>
+          </a:xfrm>
+          <a:prstGeom prst="rect">
+            <a:avLst/>
+          </a:prstGeom>
+        </p:spPr>
+      </p:pic>
+      <p:pic>
+        <p:nvPicPr>
+          <p:cNvPr id="11" name="10 Imagen" descr="blanco_sangre.jpg"/>
+          <p:cNvPicPr>
+            <a:picLocks noChangeAspect="1"/>
+          </p:cNvPicPr>
+          <p:nvPr/>
+        </p:nvPicPr>
+        <p:blipFill>
+          <a:blip r:embed="rId4"/>
+          <a:srcRect l="59376" t="6169" r="14374" b="35389"/>
+          <a:stretch>
+            <a:fillRect/>
+          </a:stretch>
+        </p:blipFill>
+        <p:spPr>
+          <a:xfrm>
+            <a:off x="7786742" y="244943"/>
+            <a:ext cx="785786" cy="898041"/>
+          </a:xfrm>
+          <a:prstGeom prst="rect">
+            <a:avLst/>
+          </a:prstGeom>
+        </p:spPr>
+      </p:pic>
+      <p:pic>
+        <p:nvPicPr>
+          <p:cNvPr id="7" name="Picture 2" descr="http://www.stockwatch.in/files/Procter-Gamble.bmp"/>
+          <p:cNvPicPr>
+            <a:picLocks noChangeAspect="1" noChangeArrowheads="1"/>
+          </p:cNvPicPr>
+          <p:nvPr/>
+        </p:nvPicPr>
+        <p:blipFill>
+          <a:blip r:embed="rId5" cstate="print"/>
+          <a:srcRect/>
+          <a:stretch>
+            <a:fillRect/>
+          </a:stretch>
+        </p:blipFill>
+        <p:spPr bwMode="auto">
+          <a:xfrm>
+            <a:off x="0" y="6215058"/>
+            <a:ext cx="1070774" cy="642942"/>
+          </a:xfrm>
+          <a:prstGeom prst="rect">
+            <a:avLst/>
+          </a:prstGeom>
+          <a:noFill/>
+        </p:spPr>
+      </p:pic>
+    </p:spTree>
+  </p:cSld>
+  <p:clrMapOvr>
+    <a:masterClrMapping/>
+  </p:clrMapOvr>
+  <p:timing>
+    <p:tnLst>
+      <p:par>
+        <p:cTn id="1" dur="indefinite" restart="never" nodeType="tmRoot"/>
+      </p:par>
+    </p:tnLst>
+  </p:timing>
+</p:sld>
+</file>
+
+<file path=ppt/slides/slide20.xml><?xml version="1.0" encoding="utf-8"?>
+<p:sld xmlns:a="http://schemas.openxmlformats.org/drawingml/2006/main" xmlns:r="http://schemas.openxmlformats.org/officeDocument/2006/relationships" xmlns:p="http://schemas.openxmlformats.org/presentationml/2006/main">
+  <p:cSld>
+    <p:spTree>
+      <p:nvGrpSpPr>
+        <p:cNvPr id="1" name=""/>
+        <p:cNvGrpSpPr/>
+        <p:nvPr/>
+      </p:nvGrpSpPr>
+      <p:grpSpPr>
+        <a:xfrm>
+          <a:off x="0" y="0"/>
+          <a:ext cx="0" cy="0"/>
+          <a:chOff x="0" y="0"/>
+          <a:chExt cx="0" cy="0"/>
+        </a:xfrm>
+      </p:grpSpPr>
+      <p:sp>
+        <p:nvSpPr>
+          <p:cNvPr id="5" name="CuadroTexto 2"/>
+          <p:cNvSpPr txBox="1">
+            <a:spLocks noChangeArrowheads="1"/>
+          </p:cNvSpPr>
+          <p:nvPr/>
+        </p:nvSpPr>
+        <p:spPr bwMode="auto">
+          <a:xfrm>
+            <a:off x="6286512" y="504825"/>
+            <a:ext cx="1555234" cy="446276"/>
+          </a:xfrm>
+          <a:prstGeom prst="rect">
+            <a:avLst/>
+          </a:prstGeom>
+          <a:noFill/>
+          <a:ln w="9525">
+            <a:noFill/>
+            <a:miter lim="800000"/>
+            <a:headEnd/>
+            <a:tailEnd/>
+          </a:ln>
+        </p:spPr>
+        <p:txBody>
+          <a:bodyPr wrap="none">
+            <a:spAutoFit/>
+          </a:bodyPr>
+          <a:lstStyle/>
+          <a:p>
+            <a:pPr algn="r"/>
+            <a:r>
+              <a:rPr lang="es-ES_tradnl" sz="2300" dirty="0" smtClean="0">
+                <a:solidFill>
+                  <a:srgbClr val="929396"/>
+                </a:solidFill>
+                <a:latin typeface="Century Gothic" pitchFamily="34" charset="0"/>
+              </a:rPr>
+              <a:t>CAMBIOS</a:t>
+            </a:r>
+            <a:endParaRPr lang="es-ES_tradnl" sz="2300" dirty="0">
+              <a:solidFill>
+                <a:srgbClr val="929396"/>
+              </a:solidFill>
+              <a:latin typeface="Century Gothic" pitchFamily="34" charset="0"/>
+            </a:endParaRPr>
+          </a:p>
+        </p:txBody>
+      </p:sp>
+      <p:sp>
+        <p:nvSpPr>
+          <p:cNvPr id="8" name="7 Rectángulo"/>
+          <p:cNvSpPr/>
+          <p:nvPr/>
+        </p:nvSpPr>
+        <p:spPr>
+          <a:xfrm>
+            <a:off x="0" y="6429396"/>
+            <a:ext cx="9144000" cy="285728"/>
+          </a:xfrm>
+          <a:prstGeom prst="rect">
+            <a:avLst/>
+          </a:prstGeom>
+          <a:solidFill>
+            <a:schemeClr val="accent1">
+              <a:lumMod val="75000"/>
+            </a:schemeClr>
+          </a:solidFill>
+          <a:ln>
+            <a:solidFill>
+              <a:schemeClr val="accent1">
+                <a:lumMod val="75000"/>
+              </a:schemeClr>
+            </a:solidFill>
+          </a:ln>
+        </p:spPr>
+        <p:style>
+          <a:lnRef idx="2">
+            <a:schemeClr val="accent1">
+              <a:shade val="50000"/>
+            </a:schemeClr>
+          </a:lnRef>
+          <a:fillRef idx="1">
+            <a:schemeClr val="accent1"/>
+          </a:fillRef>
+          <a:effectRef idx="0">
+            <a:schemeClr val="accent1"/>
+          </a:effectRef>
+          <a:fontRef idx="minor">
+            <a:schemeClr val="lt1"/>
+          </a:fontRef>
+        </p:style>
+        <p:txBody>
+          <a:bodyPr rtlCol="0" anchor="ctr"/>
+          <a:lstStyle/>
+          <a:p>
+            <a:pPr algn="ctr"/>
+            <a:endParaRPr lang="es-MX"/>
+          </a:p>
+        </p:txBody>
+      </p:sp>
+      <p:pic>
+        <p:nvPicPr>
+          <p:cNvPr id="9" name="8 Imagen" descr="tec-logo-full.jpg"/>
+          <p:cNvPicPr>
+            <a:picLocks noChangeAspect="1"/>
+          </p:cNvPicPr>
+          <p:nvPr/>
+        </p:nvPicPr>
+        <p:blipFill>
+          <a:blip r:embed="rId3" cstate="print"/>
           <a:stretch>
             <a:fillRect/>
           </a:stretch>
@@ -24051,7 +24395,82 @@
           <p:nvPr/>
         </p:nvPicPr>
         <p:blipFill>
-          <a:blip r:embed="rId5"/>
+          <a:blip r:embed="rId4"/>
+          <a:srcRect r="21429"/>
+          <a:stretch>
+            <a:fillRect/>
+          </a:stretch>
+        </p:blipFill>
+        <p:spPr bwMode="auto">
+          <a:xfrm>
+            <a:off x="714348" y="1785926"/>
+            <a:ext cx="7286676" cy="4500594"/>
+          </a:xfrm>
+          <a:prstGeom prst="rect">
+            <a:avLst/>
+          </a:prstGeom>
+          <a:noFill/>
+        </p:spPr>
+      </p:pic>
+      <p:sp>
+        <p:nvSpPr>
+          <p:cNvPr id="10" name="CuadroTexto 5"/>
+          <p:cNvSpPr txBox="1">
+            <a:spLocks noChangeArrowheads="1"/>
+          </p:cNvSpPr>
+          <p:nvPr/>
+        </p:nvSpPr>
+        <p:spPr bwMode="auto">
+          <a:xfrm>
+            <a:off x="357158" y="1142984"/>
+            <a:ext cx="8286780" cy="584775"/>
+          </a:xfrm>
+          <a:prstGeom prst="rect">
+            <a:avLst/>
+          </a:prstGeom>
+          <a:noFill/>
+          <a:ln w="9525">
+            <a:noFill/>
+            <a:miter lim="800000"/>
+            <a:headEnd/>
+            <a:tailEnd/>
+          </a:ln>
+        </p:spPr>
+        <p:txBody>
+          <a:bodyPr wrap="square">
+            <a:spAutoFit/>
+          </a:bodyPr>
+          <a:lstStyle/>
+          <a:p>
+            <a:pPr algn="just"/>
+            <a:r>
+              <a:rPr lang="es-MX" sz="1600" dirty="0" smtClean="0">
+                <a:solidFill>
+                  <a:srgbClr val="235397"/>
+                </a:solidFill>
+                <a:latin typeface="Century Gothic" pitchFamily="34" charset="0"/>
+              </a:rPr>
+              <a:t>En este apartado es donde nivel 1 observa el comentario de nivel 0, agrega sus comentarios y acepta o rechaza el cambio.</a:t>
+            </a:r>
+            <a:endParaRPr lang="es-MX" sz="1600" dirty="0">
+              <a:solidFill>
+                <a:srgbClr val="235397"/>
+              </a:solidFill>
+              <a:latin typeface="Century Gothic" pitchFamily="34" charset="0"/>
+            </a:endParaRPr>
+          </a:p>
+        </p:txBody>
+      </p:sp>
+      <p:pic>
+        <p:nvPicPr>
+          <p:cNvPr id="7" name="Picture 2" descr="http://www.stockwatch.in/files/Procter-Gamble.bmp"/>
+          <p:cNvPicPr>
+            <a:picLocks noChangeAspect="1" noChangeArrowheads="1"/>
+          </p:cNvPicPr>
+          <p:nvPr/>
+        </p:nvPicPr>
+        <p:blipFill>
+          <a:blip r:embed="rId5" cstate="print"/>
           <a:srcRect/>
           <a:stretch>
             <a:fillRect/>
@@ -24059,13 +24478,38 @@
         </p:blipFill>
         <p:spPr bwMode="auto">
           <a:xfrm>
-            <a:off x="500035" y="1000108"/>
-            <a:ext cx="7643866" cy="5072098"/>
+            <a:off x="0" y="6215058"/>
+            <a:ext cx="1070774" cy="642942"/>
           </a:xfrm>
           <a:prstGeom prst="rect">
             <a:avLst/>
           </a:prstGeom>
           <a:noFill/>
+        </p:spPr>
+      </p:pic>
+      <p:pic>
+        <p:nvPicPr>
+          <p:cNvPr id="11" name="10 Imagen" descr="blanco_sangre.jpg"/>
+          <p:cNvPicPr>
+            <a:picLocks noChangeAspect="1"/>
+          </p:cNvPicPr>
+          <p:nvPr/>
+        </p:nvPicPr>
+        <p:blipFill>
+          <a:blip r:embed="rId6"/>
+          <a:srcRect l="59376" t="6169" r="14374" b="35389"/>
+          <a:stretch>
+            <a:fillRect/>
+          </a:stretch>
+        </p:blipFill>
+        <p:spPr>
+          <a:xfrm>
+            <a:off x="7786742" y="244943"/>
+            <a:ext cx="785786" cy="898041"/>
+          </a:xfrm>
+          <a:prstGeom prst="rect">
+            <a:avLst/>
+          </a:prstGeom>
         </p:spPr>
       </p:pic>
     </p:spTree>
@@ -24083,7 +24527,7 @@
 </p:sld>
 </file>
 
-<file path=ppt/slides/slide22.xml><?xml version="1.0" encoding="utf-8"?>
+<file path=ppt/slides/slide21.xml><?xml version="1.0" encoding="utf-8"?>
 <p:sld xmlns:a="http://schemas.openxmlformats.org/drawingml/2006/main" xmlns:r="http://schemas.openxmlformats.org/officeDocument/2006/relationships" xmlns:p="http://schemas.openxmlformats.org/presentationml/2006/main">
   <p:cSld>
     <p:spTree>
@@ -24110,7 +24554,7 @@
         </p:nvSpPr>
         <p:spPr bwMode="auto">
           <a:xfrm>
-            <a:off x="5774028" y="504825"/>
+            <a:off x="6286512" y="504825"/>
             <a:ext cx="1584088" cy="446276"/>
           </a:xfrm>
           <a:prstGeom prst="rect">
@@ -24149,32 +24593,6 @@
           </a:p>
         </p:txBody>
       </p:sp>
-      <p:pic>
-        <p:nvPicPr>
-          <p:cNvPr id="8" name="Picture 2" descr="http://www.stockwatch.in/files/Procter-Gamble.bmp"/>
-          <p:cNvPicPr>
-            <a:picLocks noChangeAspect="1" noChangeArrowheads="1"/>
-          </p:cNvPicPr>
-          <p:nvPr/>
-        </p:nvPicPr>
-        <p:blipFill>
-          <a:blip r:embed="rId3" cstate="print"/>
-          <a:srcRect/>
-          <a:stretch>
-            <a:fillRect/>
-          </a:stretch>
-        </p:blipFill>
-        <p:spPr bwMode="auto">
-          <a:xfrm>
-            <a:off x="-32" y="-24"/>
-            <a:ext cx="1070774" cy="642942"/>
-          </a:xfrm>
-          <a:prstGeom prst="rect">
-            <a:avLst/>
-          </a:prstGeom>
-          <a:noFill/>
-        </p:spPr>
-      </p:pic>
       <p:sp>
         <p:nvSpPr>
           <p:cNvPr id="9" name="8 Rectángulo"/>
@@ -24236,7 +24654,7 @@
           <p:nvPr/>
         </p:nvPicPr>
         <p:blipFill>
-          <a:blip r:embed="rId4" cstate="print"/>
+          <a:blip r:embed="rId3" cstate="print"/>
           <a:stretch>
             <a:fillRect/>
           </a:stretch>
@@ -24260,7 +24678,7 @@
           <p:nvPr/>
         </p:nvPicPr>
         <p:blipFill>
-          <a:blip r:embed="rId5"/>
+          <a:blip r:embed="rId4"/>
           <a:srcRect/>
           <a:stretch>
             <a:fillRect/>
@@ -24268,8 +24686,8 @@
         </p:blipFill>
         <p:spPr bwMode="auto">
           <a:xfrm>
-            <a:off x="785786" y="1041308"/>
-            <a:ext cx="6934184" cy="5173774"/>
+            <a:off x="785786" y="1697666"/>
+            <a:ext cx="7072362" cy="4517416"/>
           </a:xfrm>
           <a:prstGeom prst="rect">
             <a:avLst/>
@@ -24277,6 +24695,106 @@
           <a:noFill/>
         </p:spPr>
       </p:pic>
+      <p:pic>
+        <p:nvPicPr>
+          <p:cNvPr id="8" name="Picture 2" descr="http://www.stockwatch.in/files/Procter-Gamble.bmp"/>
+          <p:cNvPicPr>
+            <a:picLocks noChangeAspect="1" noChangeArrowheads="1"/>
+          </p:cNvPicPr>
+          <p:nvPr/>
+        </p:nvPicPr>
+        <p:blipFill>
+          <a:blip r:embed="rId5" cstate="print"/>
+          <a:srcRect/>
+          <a:stretch>
+            <a:fillRect/>
+          </a:stretch>
+        </p:blipFill>
+        <p:spPr bwMode="auto">
+          <a:xfrm>
+            <a:off x="0" y="6215058"/>
+            <a:ext cx="1070774" cy="642942"/>
+          </a:xfrm>
+          <a:prstGeom prst="rect">
+            <a:avLst/>
+          </a:prstGeom>
+          <a:noFill/>
+        </p:spPr>
+      </p:pic>
+      <p:pic>
+        <p:nvPicPr>
+          <p:cNvPr id="7" name="6 Imagen" descr="blanco_sangre.jpg"/>
+          <p:cNvPicPr>
+            <a:picLocks noChangeAspect="1"/>
+          </p:cNvPicPr>
+          <p:nvPr/>
+        </p:nvPicPr>
+        <p:blipFill>
+          <a:blip r:embed="rId6"/>
+          <a:srcRect l="59376" t="6169" r="14374" b="35389"/>
+          <a:stretch>
+            <a:fillRect/>
+          </a:stretch>
+        </p:blipFill>
+        <p:spPr>
+          <a:xfrm>
+            <a:off x="7786742" y="244943"/>
+            <a:ext cx="785786" cy="898041"/>
+          </a:xfrm>
+          <a:prstGeom prst="rect">
+            <a:avLst/>
+          </a:prstGeom>
+        </p:spPr>
+      </p:pic>
+      <p:sp>
+        <p:nvSpPr>
+          <p:cNvPr id="11" name="CuadroTexto 5"/>
+          <p:cNvSpPr txBox="1">
+            <a:spLocks noChangeArrowheads="1"/>
+          </p:cNvSpPr>
+          <p:nvPr/>
+        </p:nvSpPr>
+        <p:spPr bwMode="auto">
+          <a:xfrm>
+            <a:off x="357158" y="1214422"/>
+            <a:ext cx="8286780" cy="584775"/>
+          </a:xfrm>
+          <a:prstGeom prst="rect">
+            <a:avLst/>
+          </a:prstGeom>
+          <a:noFill/>
+          <a:ln w="9525">
+            <a:noFill/>
+            <a:miter lim="800000"/>
+            <a:headEnd/>
+            <a:tailEnd/>
+          </a:ln>
+        </p:spPr>
+        <p:txBody>
+          <a:bodyPr wrap="square">
+            <a:spAutoFit/>
+          </a:bodyPr>
+          <a:lstStyle/>
+          <a:p>
+            <a:pPr algn="just"/>
+            <a:r>
+              <a:rPr lang="es-MX" sz="1600" dirty="0" smtClean="0">
+                <a:solidFill>
+                  <a:srgbClr val="235397"/>
+                </a:solidFill>
+                <a:latin typeface="Century Gothic" pitchFamily="34" charset="0"/>
+              </a:rPr>
+              <a:t>En este apartado se pueden ver todos los cambios que se han autorizado o rechazado y sus detalles</a:t>
+            </a:r>
+            <a:endParaRPr lang="es-MX" sz="1600" dirty="0">
+              <a:solidFill>
+                <a:srgbClr val="235397"/>
+              </a:solidFill>
+              <a:latin typeface="Century Gothic" pitchFamily="34" charset="0"/>
+            </a:endParaRPr>
+          </a:p>
+        </p:txBody>
+      </p:sp>
     </p:spTree>
   </p:cSld>
   <p:clrMapOvr>
@@ -24292,7 +24810,7 @@
 </p:sld>
 </file>
 
-<file path=ppt/slides/slide23.xml><?xml version="1.0" encoding="utf-8"?>
+<file path=ppt/slides/slide22.xml><?xml version="1.0" encoding="utf-8"?>
 <p:sld xmlns:a="http://schemas.openxmlformats.org/drawingml/2006/main" xmlns:r="http://schemas.openxmlformats.org/officeDocument/2006/relationships" xmlns:p="http://schemas.openxmlformats.org/presentationml/2006/main">
   <p:cSld>
     <p:spTree>
@@ -24418,13 +24936,38 @@
         </p:blipFill>
         <p:spPr bwMode="auto">
           <a:xfrm>
-            <a:off x="-32" y="-24"/>
+            <a:off x="0" y="6215058"/>
             <a:ext cx="1070774" cy="642942"/>
           </a:xfrm>
           <a:prstGeom prst="rect">
             <a:avLst/>
           </a:prstGeom>
           <a:noFill/>
+        </p:spPr>
+      </p:pic>
+      <p:pic>
+        <p:nvPicPr>
+          <p:cNvPr id="11" name="10 Imagen" descr="blanco_sangre.jpg"/>
+          <p:cNvPicPr>
+            <a:picLocks noChangeAspect="1"/>
+          </p:cNvPicPr>
+          <p:nvPr/>
+        </p:nvPicPr>
+        <p:blipFill>
+          <a:blip r:embed="rId9"/>
+          <a:srcRect l="60600" t="6169" r="14374" b="37509"/>
+          <a:stretch>
+            <a:fillRect/>
+          </a:stretch>
+        </p:blipFill>
+        <p:spPr>
+          <a:xfrm>
+            <a:off x="7143768" y="71414"/>
+            <a:ext cx="1643074" cy="1898173"/>
+          </a:xfrm>
+          <a:prstGeom prst="rect">
+            <a:avLst/>
+          </a:prstGeom>
         </p:spPr>
       </p:pic>
     </p:spTree>
@@ -24442,7 +24985,7 @@
 </p:sld>
 </file>
 
-<file path=ppt/slides/slide24.xml><?xml version="1.0" encoding="utf-8"?>
+<file path=ppt/slides/slide23.xml><?xml version="1.0" encoding="utf-8"?>
 <p:sld xmlns:a="http://schemas.openxmlformats.org/drawingml/2006/main" xmlns:r="http://schemas.openxmlformats.org/officeDocument/2006/relationships" xmlns:p="http://schemas.openxmlformats.org/presentationml/2006/main">
   <p:cSld>
     <p:spTree>
@@ -24469,7 +25012,7 @@
         </p:nvSpPr>
         <p:spPr bwMode="auto">
           <a:xfrm>
-            <a:off x="6141103" y="504825"/>
+            <a:off x="6643702" y="504825"/>
             <a:ext cx="1217000" cy="446276"/>
           </a:xfrm>
           <a:prstGeom prst="rect">
@@ -24518,7 +25061,7 @@
         </p:nvSpPr>
         <p:spPr bwMode="auto">
           <a:xfrm>
-            <a:off x="357158" y="1714488"/>
+            <a:off x="357158" y="1285860"/>
             <a:ext cx="8286780" cy="338554"/>
           </a:xfrm>
           <a:prstGeom prst="rect">
@@ -24557,32 +25100,6 @@
           </a:p>
         </p:txBody>
       </p:sp>
-      <p:pic>
-        <p:nvPicPr>
-          <p:cNvPr id="8" name="Picture 2" descr="http://www.stockwatch.in/files/Procter-Gamble.bmp"/>
-          <p:cNvPicPr>
-            <a:picLocks noChangeAspect="1" noChangeArrowheads="1"/>
-          </p:cNvPicPr>
-          <p:nvPr/>
-        </p:nvPicPr>
-        <p:blipFill>
-          <a:blip r:embed="rId3" cstate="print"/>
-          <a:srcRect/>
-          <a:stretch>
-            <a:fillRect/>
-          </a:stretch>
-        </p:blipFill>
-        <p:spPr bwMode="auto">
-          <a:xfrm>
-            <a:off x="-32" y="-24"/>
-            <a:ext cx="1070774" cy="642942"/>
-          </a:xfrm>
-          <a:prstGeom prst="rect">
-            <a:avLst/>
-          </a:prstGeom>
-          <a:noFill/>
-        </p:spPr>
-      </p:pic>
       <p:sp>
         <p:nvSpPr>
           <p:cNvPr id="9" name="8 Rectángulo"/>
@@ -24644,7 +25161,7 @@
           <p:nvPr/>
         </p:nvPicPr>
         <p:blipFill>
-          <a:blip r:embed="rId4" cstate="print"/>
+          <a:blip r:embed="rId3" cstate="print"/>
           <a:stretch>
             <a:fillRect/>
           </a:stretch>
@@ -24668,7 +25185,7 @@
           <p:nvPr/>
         </p:nvPicPr>
         <p:blipFill>
-          <a:blip r:embed="rId5"/>
+          <a:blip r:embed="rId4"/>
           <a:srcRect/>
           <a:stretch>
             <a:fillRect/>
@@ -24676,13 +25193,64 @@
         </p:blipFill>
         <p:spPr bwMode="auto">
           <a:xfrm>
-            <a:off x="0" y="2571744"/>
-            <a:ext cx="8905875" cy="2981325"/>
+            <a:off x="0" y="2143116"/>
+            <a:ext cx="8905875" cy="3409953"/>
           </a:xfrm>
           <a:prstGeom prst="rect">
             <a:avLst/>
           </a:prstGeom>
           <a:noFill/>
+        </p:spPr>
+      </p:pic>
+      <p:pic>
+        <p:nvPicPr>
+          <p:cNvPr id="8" name="Picture 2" descr="http://www.stockwatch.in/files/Procter-Gamble.bmp"/>
+          <p:cNvPicPr>
+            <a:picLocks noChangeAspect="1" noChangeArrowheads="1"/>
+          </p:cNvPicPr>
+          <p:nvPr/>
+        </p:nvPicPr>
+        <p:blipFill>
+          <a:blip r:embed="rId5" cstate="print"/>
+          <a:srcRect/>
+          <a:stretch>
+            <a:fillRect/>
+          </a:stretch>
+        </p:blipFill>
+        <p:spPr bwMode="auto">
+          <a:xfrm>
+            <a:off x="0" y="6215058"/>
+            <a:ext cx="1070774" cy="642942"/>
+          </a:xfrm>
+          <a:prstGeom prst="rect">
+            <a:avLst/>
+          </a:prstGeom>
+          <a:noFill/>
+        </p:spPr>
+      </p:pic>
+      <p:pic>
+        <p:nvPicPr>
+          <p:cNvPr id="11" name="10 Imagen" descr="blanco_sangre.jpg"/>
+          <p:cNvPicPr>
+            <a:picLocks noChangeAspect="1"/>
+          </p:cNvPicPr>
+          <p:nvPr/>
+        </p:nvPicPr>
+        <p:blipFill>
+          <a:blip r:embed="rId6"/>
+          <a:srcRect l="59376" t="6169" r="14374" b="35389"/>
+          <a:stretch>
+            <a:fillRect/>
+          </a:stretch>
+        </p:blipFill>
+        <p:spPr>
+          <a:xfrm>
+            <a:off x="7786742" y="244943"/>
+            <a:ext cx="785786" cy="898041"/>
+          </a:xfrm>
+          <a:prstGeom prst="rect">
+            <a:avLst/>
+          </a:prstGeom>
         </p:spPr>
       </p:pic>
     </p:spTree>
@@ -24700,7 +25268,7 @@
 </p:sld>
 </file>
 
-<file path=ppt/slides/slide25.xml><?xml version="1.0" encoding="utf-8"?>
+<file path=ppt/slides/slide24.xml><?xml version="1.0" encoding="utf-8"?>
 <p:sld xmlns:a="http://schemas.openxmlformats.org/drawingml/2006/main" xmlns:r="http://schemas.openxmlformats.org/officeDocument/2006/relationships" xmlns:p="http://schemas.openxmlformats.org/presentationml/2006/main">
   <p:cSld>
     <p:spTree>
@@ -24727,7 +25295,7 @@
         </p:nvSpPr>
         <p:spPr bwMode="auto">
           <a:xfrm>
-            <a:off x="5802873" y="504825"/>
+            <a:off x="6286512" y="504825"/>
             <a:ext cx="1555234" cy="446276"/>
           </a:xfrm>
           <a:prstGeom prst="rect">
@@ -24766,32 +25334,6 @@
           </a:p>
         </p:txBody>
       </p:sp>
-      <p:pic>
-        <p:nvPicPr>
-          <p:cNvPr id="7" name="Picture 2" descr="http://www.stockwatch.in/files/Procter-Gamble.bmp"/>
-          <p:cNvPicPr>
-            <a:picLocks noChangeAspect="1" noChangeArrowheads="1"/>
-          </p:cNvPicPr>
-          <p:nvPr/>
-        </p:nvPicPr>
-        <p:blipFill>
-          <a:blip r:embed="rId3" cstate="print"/>
-          <a:srcRect/>
-          <a:stretch>
-            <a:fillRect/>
-          </a:stretch>
-        </p:blipFill>
-        <p:spPr bwMode="auto">
-          <a:xfrm>
-            <a:off x="-32" y="-24"/>
-            <a:ext cx="1070774" cy="642942"/>
-          </a:xfrm>
-          <a:prstGeom prst="rect">
-            <a:avLst/>
-          </a:prstGeom>
-          <a:noFill/>
-        </p:spPr>
-      </p:pic>
       <p:sp>
         <p:nvSpPr>
           <p:cNvPr id="8" name="7 Rectángulo"/>
@@ -24853,7 +25395,7 @@
           <p:nvPr/>
         </p:nvPicPr>
         <p:blipFill>
-          <a:blip r:embed="rId4" cstate="print"/>
+          <a:blip r:embed="rId3" cstate="print"/>
           <a:stretch>
             <a:fillRect/>
           </a:stretch>
@@ -24877,7 +25419,82 @@
           <p:nvPr/>
         </p:nvPicPr>
         <p:blipFill>
-          <a:blip r:embed="rId5"/>
+          <a:blip r:embed="rId4"/>
+          <a:srcRect r="33218"/>
+          <a:stretch>
+            <a:fillRect/>
+          </a:stretch>
+        </p:blipFill>
+        <p:spPr bwMode="auto">
+          <a:xfrm>
+            <a:off x="1071538" y="1928802"/>
+            <a:ext cx="5857916" cy="4148343"/>
+          </a:xfrm>
+          <a:prstGeom prst="rect">
+            <a:avLst/>
+          </a:prstGeom>
+          <a:noFill/>
+        </p:spPr>
+      </p:pic>
+      <p:sp>
+        <p:nvSpPr>
+          <p:cNvPr id="10" name="CuadroTexto 5"/>
+          <p:cNvSpPr txBox="1">
+            <a:spLocks noChangeArrowheads="1"/>
+          </p:cNvSpPr>
+          <p:nvPr/>
+        </p:nvSpPr>
+        <p:spPr bwMode="auto">
+          <a:xfrm>
+            <a:off x="357158" y="1214422"/>
+            <a:ext cx="8286780" cy="584775"/>
+          </a:xfrm>
+          <a:prstGeom prst="rect">
+            <a:avLst/>
+          </a:prstGeom>
+          <a:noFill/>
+          <a:ln w="9525">
+            <a:noFill/>
+            <a:miter lim="800000"/>
+            <a:headEnd/>
+            <a:tailEnd/>
+          </a:ln>
+        </p:spPr>
+        <p:txBody>
+          <a:bodyPr wrap="square">
+            <a:spAutoFit/>
+          </a:bodyPr>
+          <a:lstStyle/>
+          <a:p>
+            <a:pPr algn="just"/>
+            <a:r>
+              <a:rPr lang="es-MX" sz="1600" dirty="0" smtClean="0">
+                <a:solidFill>
+                  <a:srgbClr val="235397"/>
+                </a:solidFill>
+                <a:latin typeface="Century Gothic" pitchFamily="34" charset="0"/>
+              </a:rPr>
+              <a:t>En este apartado es donde nivel 2 observa el comentario de nivel 0 y nivel 1, agrega sus comentarios y acepta o rechaza el cambio.</a:t>
+            </a:r>
+            <a:endParaRPr lang="es-MX" sz="1600" dirty="0">
+              <a:solidFill>
+                <a:srgbClr val="235397"/>
+              </a:solidFill>
+              <a:latin typeface="Century Gothic" pitchFamily="34" charset="0"/>
+            </a:endParaRPr>
+          </a:p>
+        </p:txBody>
+      </p:sp>
+      <p:pic>
+        <p:nvPicPr>
+          <p:cNvPr id="7" name="Picture 2" descr="http://www.stockwatch.in/files/Procter-Gamble.bmp"/>
+          <p:cNvPicPr>
+            <a:picLocks noChangeAspect="1" noChangeArrowheads="1"/>
+          </p:cNvPicPr>
+          <p:nvPr/>
+        </p:nvPicPr>
+        <p:blipFill>
+          <a:blip r:embed="rId5" cstate="print"/>
           <a:srcRect/>
           <a:stretch>
             <a:fillRect/>
@@ -24885,13 +25502,38 @@
         </p:blipFill>
         <p:spPr bwMode="auto">
           <a:xfrm>
-            <a:off x="1071538" y="877984"/>
-            <a:ext cx="6418273" cy="5199161"/>
+            <a:off x="0" y="6215058"/>
+            <a:ext cx="1070774" cy="642942"/>
           </a:xfrm>
           <a:prstGeom prst="rect">
             <a:avLst/>
           </a:prstGeom>
           <a:noFill/>
+        </p:spPr>
+      </p:pic>
+      <p:pic>
+        <p:nvPicPr>
+          <p:cNvPr id="11" name="10 Imagen" descr="blanco_sangre.jpg"/>
+          <p:cNvPicPr>
+            <a:picLocks noChangeAspect="1"/>
+          </p:cNvPicPr>
+          <p:nvPr/>
+        </p:nvPicPr>
+        <p:blipFill>
+          <a:blip r:embed="rId6"/>
+          <a:srcRect l="59376" t="6169" r="14374" b="35389"/>
+          <a:stretch>
+            <a:fillRect/>
+          </a:stretch>
+        </p:blipFill>
+        <p:spPr>
+          <a:xfrm>
+            <a:off x="7786742" y="244943"/>
+            <a:ext cx="785786" cy="898041"/>
+          </a:xfrm>
+          <a:prstGeom prst="rect">
+            <a:avLst/>
+          </a:prstGeom>
         </p:spPr>
       </p:pic>
     </p:spTree>
@@ -24909,7 +25551,7 @@
 </p:sld>
 </file>
 
-<file path=ppt/slides/slide26.xml><?xml version="1.0" encoding="utf-8"?>
+<file path=ppt/slides/slide25.xml><?xml version="1.0" encoding="utf-8"?>
 <p:sld xmlns:a="http://schemas.openxmlformats.org/drawingml/2006/main" xmlns:r="http://schemas.openxmlformats.org/officeDocument/2006/relationships" xmlns:p="http://schemas.openxmlformats.org/presentationml/2006/main">
   <p:cSld>
     <p:spTree>
@@ -24936,7 +25578,7 @@
         </p:nvSpPr>
         <p:spPr bwMode="auto">
           <a:xfrm>
-            <a:off x="5774028" y="504825"/>
+            <a:off x="6286512" y="504825"/>
             <a:ext cx="1584088" cy="446276"/>
           </a:xfrm>
           <a:prstGeom prst="rect">
@@ -24975,32 +25617,6 @@
           </a:p>
         </p:txBody>
       </p:sp>
-      <p:pic>
-        <p:nvPicPr>
-          <p:cNvPr id="8" name="Picture 2" descr="http://www.stockwatch.in/files/Procter-Gamble.bmp"/>
-          <p:cNvPicPr>
-            <a:picLocks noChangeAspect="1" noChangeArrowheads="1"/>
-          </p:cNvPicPr>
-          <p:nvPr/>
-        </p:nvPicPr>
-        <p:blipFill>
-          <a:blip r:embed="rId3" cstate="print"/>
-          <a:srcRect/>
-          <a:stretch>
-            <a:fillRect/>
-          </a:stretch>
-        </p:blipFill>
-        <p:spPr bwMode="auto">
-          <a:xfrm>
-            <a:off x="-32" y="-24"/>
-            <a:ext cx="1070774" cy="642942"/>
-          </a:xfrm>
-          <a:prstGeom prst="rect">
-            <a:avLst/>
-          </a:prstGeom>
-          <a:noFill/>
-        </p:spPr>
-      </p:pic>
       <p:sp>
         <p:nvSpPr>
           <p:cNvPr id="9" name="8 Rectángulo"/>
@@ -25062,7 +25678,7 @@
           <p:nvPr/>
         </p:nvPicPr>
         <p:blipFill>
-          <a:blip r:embed="rId4" cstate="print"/>
+          <a:blip r:embed="rId3" cstate="print"/>
           <a:stretch>
             <a:fillRect/>
           </a:stretch>
@@ -25086,7 +25702,7 @@
           <p:nvPr/>
         </p:nvPicPr>
         <p:blipFill>
-          <a:blip r:embed="rId5"/>
+          <a:blip r:embed="rId4"/>
           <a:srcRect/>
           <a:stretch>
             <a:fillRect/>
@@ -25094,8 +25710,8 @@
         </p:blipFill>
         <p:spPr bwMode="auto">
           <a:xfrm>
-            <a:off x="390525" y="1142984"/>
-            <a:ext cx="8753475" cy="4219575"/>
+            <a:off x="390525" y="1924069"/>
+            <a:ext cx="8253441" cy="4219575"/>
           </a:xfrm>
           <a:prstGeom prst="rect">
             <a:avLst/>
@@ -25103,6 +25719,106 @@
           <a:noFill/>
         </p:spPr>
       </p:pic>
+      <p:pic>
+        <p:nvPicPr>
+          <p:cNvPr id="8" name="Picture 2" descr="http://www.stockwatch.in/files/Procter-Gamble.bmp"/>
+          <p:cNvPicPr>
+            <a:picLocks noChangeAspect="1" noChangeArrowheads="1"/>
+          </p:cNvPicPr>
+          <p:nvPr/>
+        </p:nvPicPr>
+        <p:blipFill>
+          <a:blip r:embed="rId5" cstate="print"/>
+          <a:srcRect/>
+          <a:stretch>
+            <a:fillRect/>
+          </a:stretch>
+        </p:blipFill>
+        <p:spPr bwMode="auto">
+          <a:xfrm>
+            <a:off x="0" y="6215058"/>
+            <a:ext cx="1070774" cy="642942"/>
+          </a:xfrm>
+          <a:prstGeom prst="rect">
+            <a:avLst/>
+          </a:prstGeom>
+          <a:noFill/>
+        </p:spPr>
+      </p:pic>
+      <p:pic>
+        <p:nvPicPr>
+          <p:cNvPr id="7" name="6 Imagen" descr="blanco_sangre.jpg"/>
+          <p:cNvPicPr>
+            <a:picLocks noChangeAspect="1"/>
+          </p:cNvPicPr>
+          <p:nvPr/>
+        </p:nvPicPr>
+        <p:blipFill>
+          <a:blip r:embed="rId6"/>
+          <a:srcRect l="59376" t="6169" r="14374" b="35389"/>
+          <a:stretch>
+            <a:fillRect/>
+          </a:stretch>
+        </p:blipFill>
+        <p:spPr>
+          <a:xfrm>
+            <a:off x="7786742" y="244943"/>
+            <a:ext cx="785786" cy="898041"/>
+          </a:xfrm>
+          <a:prstGeom prst="rect">
+            <a:avLst/>
+          </a:prstGeom>
+        </p:spPr>
+      </p:pic>
+      <p:sp>
+        <p:nvSpPr>
+          <p:cNvPr id="11" name="CuadroTexto 5"/>
+          <p:cNvSpPr txBox="1">
+            <a:spLocks noChangeArrowheads="1"/>
+          </p:cNvSpPr>
+          <p:nvPr/>
+        </p:nvSpPr>
+        <p:spPr bwMode="auto">
+          <a:xfrm>
+            <a:off x="357158" y="1357298"/>
+            <a:ext cx="8286780" cy="584775"/>
+          </a:xfrm>
+          <a:prstGeom prst="rect">
+            <a:avLst/>
+          </a:prstGeom>
+          <a:noFill/>
+          <a:ln w="9525">
+            <a:noFill/>
+            <a:miter lim="800000"/>
+            <a:headEnd/>
+            <a:tailEnd/>
+          </a:ln>
+        </p:spPr>
+        <p:txBody>
+          <a:bodyPr wrap="square">
+            <a:spAutoFit/>
+          </a:bodyPr>
+          <a:lstStyle/>
+          <a:p>
+            <a:pPr algn="just"/>
+            <a:r>
+              <a:rPr lang="es-MX" sz="1600" dirty="0" smtClean="0">
+                <a:solidFill>
+                  <a:srgbClr val="235397"/>
+                </a:solidFill>
+                <a:latin typeface="Century Gothic" pitchFamily="34" charset="0"/>
+              </a:rPr>
+              <a:t>En este apartado se pueden ver todos los cambios que se han autorizado o rechazado y sus detalles</a:t>
+            </a:r>
+            <a:endParaRPr lang="es-MX" sz="1600" dirty="0">
+              <a:solidFill>
+                <a:srgbClr val="235397"/>
+              </a:solidFill>
+              <a:latin typeface="Century Gothic" pitchFamily="34" charset="0"/>
+            </a:endParaRPr>
+          </a:p>
+        </p:txBody>
+      </p:sp>
     </p:spTree>
   </p:cSld>
   <p:clrMapOvr>
@@ -25118,7 +25834,7 @@
 </p:sld>
 </file>
 
-<file path=ppt/slides/slide27.xml><?xml version="1.0" encoding="utf-8"?>
+<file path=ppt/slides/slide26.xml><?xml version="1.0" encoding="utf-8"?>
 <p:sld xmlns:a="http://schemas.openxmlformats.org/drawingml/2006/main" xmlns:r="http://schemas.openxmlformats.org/officeDocument/2006/relationships" xmlns:p="http://schemas.openxmlformats.org/presentationml/2006/main">
   <p:cSld>
     <p:spTree>
@@ -25145,7 +25861,7 @@
         </p:nvSpPr>
         <p:spPr bwMode="auto">
           <a:xfrm>
-            <a:off x="6028616" y="504825"/>
+            <a:off x="6500826" y="504825"/>
             <a:ext cx="1354858" cy="446276"/>
           </a:xfrm>
           <a:prstGeom prst="rect">
@@ -25194,7 +25910,7 @@
         </p:nvSpPr>
         <p:spPr bwMode="auto">
           <a:xfrm>
-            <a:off x="4143372" y="2281190"/>
+            <a:off x="357158" y="1571612"/>
             <a:ext cx="4500566" cy="2554545"/>
           </a:xfrm>
           <a:prstGeom prst="rect">
@@ -25233,32 +25949,6 @@
           </a:p>
         </p:txBody>
       </p:sp>
-      <p:pic>
-        <p:nvPicPr>
-          <p:cNvPr id="8" name="Picture 2" descr="http://www.stockwatch.in/files/Procter-Gamble.bmp"/>
-          <p:cNvPicPr>
-            <a:picLocks noChangeAspect="1" noChangeArrowheads="1"/>
-          </p:cNvPicPr>
-          <p:nvPr/>
-        </p:nvPicPr>
-        <p:blipFill>
-          <a:blip r:embed="rId3" cstate="print"/>
-          <a:srcRect/>
-          <a:stretch>
-            <a:fillRect/>
-          </a:stretch>
-        </p:blipFill>
-        <p:spPr bwMode="auto">
-          <a:xfrm>
-            <a:off x="-32" y="-24"/>
-            <a:ext cx="1070774" cy="642942"/>
-          </a:xfrm>
-          <a:prstGeom prst="rect">
-            <a:avLst/>
-          </a:prstGeom>
-          <a:noFill/>
-        </p:spPr>
-      </p:pic>
       <p:sp>
         <p:nvSpPr>
           <p:cNvPr id="9" name="8 Rectángulo"/>
@@ -25320,7 +26010,7 @@
           <p:nvPr/>
         </p:nvPicPr>
         <p:blipFill>
-          <a:blip r:embed="rId4" cstate="print"/>
+          <a:blip r:embed="rId3" cstate="print"/>
           <a:stretch>
             <a:fillRect/>
           </a:stretch>
@@ -25344,7 +26034,7 @@
           <p:nvPr/>
         </p:nvPicPr>
         <p:blipFill>
-          <a:blip r:embed="rId5"/>
+          <a:blip r:embed="rId4"/>
           <a:srcRect r="27500"/>
           <a:stretch>
             <a:fillRect/>
@@ -25352,7 +26042,7 @@
         </p:blipFill>
         <p:spPr>
           <a:xfrm>
-            <a:off x="714348" y="2233613"/>
+            <a:off x="5214942" y="2643182"/>
             <a:ext cx="3250337" cy="2981337"/>
           </a:xfrm>
           <a:prstGeom prst="rect">
@@ -25364,6 +26054,57 @@
           <a:effectLst>
             <a:softEdge rad="112500"/>
           </a:effectLst>
+        </p:spPr>
+      </p:pic>
+      <p:pic>
+        <p:nvPicPr>
+          <p:cNvPr id="8" name="Picture 2" descr="http://www.stockwatch.in/files/Procter-Gamble.bmp"/>
+          <p:cNvPicPr>
+            <a:picLocks noChangeAspect="1" noChangeArrowheads="1"/>
+          </p:cNvPicPr>
+          <p:nvPr/>
+        </p:nvPicPr>
+        <p:blipFill>
+          <a:blip r:embed="rId5" cstate="print"/>
+          <a:srcRect/>
+          <a:stretch>
+            <a:fillRect/>
+          </a:stretch>
+        </p:blipFill>
+        <p:spPr bwMode="auto">
+          <a:xfrm>
+            <a:off x="0" y="6215058"/>
+            <a:ext cx="1070774" cy="642942"/>
+          </a:xfrm>
+          <a:prstGeom prst="rect">
+            <a:avLst/>
+          </a:prstGeom>
+          <a:noFill/>
+        </p:spPr>
+      </p:pic>
+      <p:pic>
+        <p:nvPicPr>
+          <p:cNvPr id="12" name="11 Imagen" descr="blanco_sangre.jpg"/>
+          <p:cNvPicPr>
+            <a:picLocks noChangeAspect="1"/>
+          </p:cNvPicPr>
+          <p:nvPr/>
+        </p:nvPicPr>
+        <p:blipFill>
+          <a:blip r:embed="rId6"/>
+          <a:srcRect l="59376" t="6169" r="14374" b="35389"/>
+          <a:stretch>
+            <a:fillRect/>
+          </a:stretch>
+        </p:blipFill>
+        <p:spPr>
+          <a:xfrm>
+            <a:off x="7786742" y="244943"/>
+            <a:ext cx="785786" cy="898041"/>
+          </a:xfrm>
+          <a:prstGeom prst="rect">
+            <a:avLst/>
+          </a:prstGeom>
         </p:spPr>
       </p:pic>
     </p:spTree>
@@ -25381,7 +26122,7 @@
 </p:sld>
 </file>
 
-<file path=ppt/slides/slide3.xml><?xml version="1.0" encoding="utf-8"?>
+<file path=ppt/slides/slide27.xml><?xml version="1.0" encoding="utf-8"?>
 <p:sld xmlns:a="http://schemas.openxmlformats.org/drawingml/2006/main" xmlns:r="http://schemas.openxmlformats.org/officeDocument/2006/relationships" xmlns:p="http://schemas.openxmlformats.org/presentationml/2006/main">
   <p:cSld>
     <p:spTree>
@@ -25408,8 +26149,8 @@
         </p:nvSpPr>
         <p:spPr bwMode="auto">
           <a:xfrm>
-            <a:off x="5000628" y="504825"/>
-            <a:ext cx="2481262" cy="446088"/>
+            <a:off x="6072198" y="504825"/>
+            <a:ext cx="1811714" cy="446276"/>
           </a:xfrm>
           <a:prstGeom prst="rect">
             <a:avLst/>
@@ -25430,14 +26171,20 @@
           <a:p>
             <a:pPr algn="r"/>
             <a:r>
-              <a:rPr lang="es-ES_tradnl" sz="2300" dirty="0">
+              <a:rPr lang="es-ES_tradnl" sz="2300" dirty="0" smtClean="0">
                 <a:solidFill>
                   <a:srgbClr val="929396"/>
                 </a:solidFill>
                 <a:latin typeface="Century Gothic" pitchFamily="34" charset="0"/>
               </a:rPr>
-              <a:t>PROBLEMÁTICA</a:t>
+              <a:t>BENEFICIOS</a:t>
             </a:r>
+            <a:endParaRPr lang="es-ES_tradnl" sz="2300" dirty="0">
+              <a:solidFill>
+                <a:srgbClr val="929396"/>
+              </a:solidFill>
+              <a:latin typeface="Century Gothic" pitchFamily="34" charset="0"/>
+            </a:endParaRPr>
           </a:p>
         </p:txBody>
       </p:sp>
@@ -25451,8 +26198,8 @@
         </p:nvSpPr>
         <p:spPr bwMode="auto">
           <a:xfrm>
-            <a:off x="381000" y="1957037"/>
-            <a:ext cx="8262938" cy="2554545"/>
+            <a:off x="3857648" y="1341200"/>
+            <a:ext cx="4857756" cy="5016758"/>
           </a:xfrm>
           <a:prstGeom prst="rect">
             <a:avLst/>
@@ -25466,7 +26213,7 @@
           </a:ln>
         </p:spPr>
         <p:txBody>
-          <a:bodyPr>
+          <a:bodyPr wrap="square">
             <a:spAutoFit/>
           </a:bodyPr>
           <a:lstStyle/>
@@ -25479,7 +26226,97 @@
                 </a:solidFill>
                 <a:latin typeface="Century Gothic" pitchFamily="34" charset="0"/>
               </a:rPr>
-              <a:t>El tiempo en un proceso de control de cambios tiene un gran impacto en la planta industrial, hablando en cuanto a economía, por ende es necesario optimizar los tiempos de dicho proceso y evitar que por un retraso o falta de cambio haya pérdidas económicas para la planta.</a:t>
+              <a:t>El proceso </a:t>
+            </a:r>
+            <a:r>
+              <a:rPr lang="es-MX" sz="1600" dirty="0" smtClean="0">
+                <a:solidFill>
+                  <a:srgbClr val="235397"/>
+                </a:solidFill>
+                <a:latin typeface="Century Gothic" pitchFamily="34" charset="0"/>
+              </a:rPr>
+              <a:t>dura </a:t>
+            </a:r>
+            <a:r>
+              <a:rPr lang="es-MX" sz="1600" dirty="0" smtClean="0">
+                <a:solidFill>
+                  <a:srgbClr val="235397"/>
+                </a:solidFill>
+                <a:latin typeface="Century Gothic" pitchFamily="34" charset="0"/>
+              </a:rPr>
+              <a:t>menos tiempo en cada uno de los pasos, debido a que los cambios se </a:t>
+            </a:r>
+            <a:r>
+              <a:rPr lang="es-MX" sz="1600" dirty="0" smtClean="0">
+                <a:solidFill>
+                  <a:srgbClr val="235397"/>
+                </a:solidFill>
+                <a:latin typeface="Century Gothic" pitchFamily="34" charset="0"/>
+              </a:rPr>
+              <a:t>canalizan </a:t>
+            </a:r>
+            <a:r>
+              <a:rPr lang="es-MX" sz="1600" dirty="0" smtClean="0">
+                <a:solidFill>
+                  <a:srgbClr val="235397"/>
+                </a:solidFill>
+                <a:latin typeface="Century Gothic" pitchFamily="34" charset="0"/>
+              </a:rPr>
+              <a:t>automáticamente a los respectivos supervisores y agregando recordatorios por día de retraso, el sistema </a:t>
+            </a:r>
+            <a:r>
+              <a:rPr lang="es-MX" sz="1600" dirty="0" smtClean="0">
+                <a:solidFill>
+                  <a:srgbClr val="235397"/>
+                </a:solidFill>
+                <a:latin typeface="Century Gothic" pitchFamily="34" charset="0"/>
+              </a:rPr>
+              <a:t>optimiza </a:t>
+            </a:r>
+            <a:r>
+              <a:rPr lang="es-MX" sz="1600" dirty="0" smtClean="0">
+                <a:solidFill>
+                  <a:srgbClr val="235397"/>
+                </a:solidFill>
+                <a:latin typeface="Century Gothic" pitchFamily="34" charset="0"/>
+              </a:rPr>
+              <a:t>la duración total de los cambios pues sólo </a:t>
+            </a:r>
+            <a:r>
+              <a:rPr lang="es-MX" sz="1600" dirty="0" smtClean="0">
+                <a:solidFill>
+                  <a:srgbClr val="235397"/>
+                </a:solidFill>
+                <a:latin typeface="Century Gothic" pitchFamily="34" charset="0"/>
+              </a:rPr>
+              <a:t>permite </a:t>
+            </a:r>
+            <a:r>
+              <a:rPr lang="es-MX" sz="1600" dirty="0" smtClean="0">
+                <a:solidFill>
+                  <a:srgbClr val="235397"/>
+                </a:solidFill>
+                <a:latin typeface="Century Gothic" pitchFamily="34" charset="0"/>
+              </a:rPr>
+              <a:t>que el cambio permanezca sin autorización máximo un día después de haber sido informado el correspondiente supervisor. Dicha medida </a:t>
+            </a:r>
+            <a:r>
+              <a:rPr lang="es-MX" sz="1600" dirty="0" smtClean="0">
+                <a:solidFill>
+                  <a:srgbClr val="235397"/>
+                </a:solidFill>
+                <a:latin typeface="Century Gothic" pitchFamily="34" charset="0"/>
+              </a:rPr>
+              <a:t>permite </a:t>
+            </a:r>
+            <a:r>
+              <a:rPr lang="es-MX" sz="1600" dirty="0" smtClean="0">
+                <a:solidFill>
+                  <a:srgbClr val="235397"/>
+                </a:solidFill>
+                <a:latin typeface="Century Gothic" pitchFamily="34" charset="0"/>
+              </a:rPr>
+              <a:t>que los cambios estén autorizados en no más de una semana.</a:t>
             </a:r>
           </a:p>
           <a:p>
@@ -25500,7 +26337,70 @@
                 </a:solidFill>
                 <a:latin typeface="Century Gothic" pitchFamily="34" charset="0"/>
               </a:rPr>
-              <a:t>Actualmente cada vez que se desea hacer un cambio, suele tardar mucho tiempo en ser procesado y aceptado. Además en muchas ocasiones, las personas encargadas de autorizar dichos cambios dejan de lado éstos, por lo que se van acumulando y por consecuencia la aprobación de los cambios llegan a retrasarse por varios días o en el peor de los casos no se realizan.</a:t>
+              <a:t>El sistema </a:t>
+            </a:r>
+            <a:r>
+              <a:rPr lang="es-MX" sz="1600" dirty="0" smtClean="0">
+                <a:solidFill>
+                  <a:srgbClr val="235397"/>
+                </a:solidFill>
+                <a:latin typeface="Century Gothic" pitchFamily="34" charset="0"/>
+              </a:rPr>
+              <a:t>es </a:t>
+            </a:r>
+            <a:r>
+              <a:rPr lang="es-MX" sz="1600" dirty="0" smtClean="0">
+                <a:solidFill>
+                  <a:srgbClr val="235397"/>
+                </a:solidFill>
+                <a:latin typeface="Century Gothic" pitchFamily="34" charset="0"/>
+              </a:rPr>
+              <a:t>fácil de utilizar y tolerante a fallas pues el </a:t>
+            </a:r>
+            <a:r>
+              <a:rPr lang="es-MX" sz="1600" dirty="0" smtClean="0">
+                <a:solidFill>
+                  <a:srgbClr val="235397"/>
+                </a:solidFill>
+                <a:latin typeface="Century Gothic" pitchFamily="34" charset="0"/>
+              </a:rPr>
+              <a:t>debe </a:t>
+            </a:r>
+            <a:r>
+              <a:rPr lang="es-MX" sz="1600" dirty="0" smtClean="0">
+                <a:solidFill>
+                  <a:srgbClr val="235397"/>
+                </a:solidFill>
+                <a:latin typeface="Century Gothic" pitchFamily="34" charset="0"/>
+              </a:rPr>
+              <a:t>facilitar al desarrollo del proceso de cambios y evitar retrasos e inconsistencias. El aprendizaje del sistema, por su simplicidad, no </a:t>
+            </a:r>
+            <a:r>
+              <a:rPr lang="es-MX" sz="1600" dirty="0" smtClean="0">
+                <a:solidFill>
+                  <a:srgbClr val="235397"/>
+                </a:solidFill>
+                <a:latin typeface="Century Gothic" pitchFamily="34" charset="0"/>
+              </a:rPr>
+              <a:t>necesita </a:t>
+            </a:r>
+            <a:r>
+              <a:rPr lang="es-MX" sz="1600" dirty="0" smtClean="0">
+                <a:solidFill>
+                  <a:srgbClr val="235397"/>
+                </a:solidFill>
+                <a:latin typeface="Century Gothic" pitchFamily="34" charset="0"/>
+              </a:rPr>
+              <a:t>de una curva de aprendizaje grande, es por ello que los supervisores y los administradores podrán autorizar los cambios en tiempo</a:t>
+            </a:r>
+            <a:r>
+              <a:rPr lang="es-MX" sz="1600" dirty="0" smtClean="0">
+                <a:solidFill>
+                  <a:srgbClr val="235397"/>
+                </a:solidFill>
+                <a:latin typeface="Century Gothic" pitchFamily="34" charset="0"/>
+              </a:rPr>
+              <a:t>.</a:t>
             </a:r>
             <a:endParaRPr lang="es-MX" sz="1600" dirty="0">
               <a:solidFill>
@@ -25511,35 +26411,9 @@
           </a:p>
         </p:txBody>
       </p:sp>
-      <p:pic>
-        <p:nvPicPr>
-          <p:cNvPr id="7" name="Picture 2" descr="http://www.stockwatch.in/files/Procter-Gamble.bmp"/>
-          <p:cNvPicPr>
-            <a:picLocks noChangeAspect="1" noChangeArrowheads="1"/>
-          </p:cNvPicPr>
-          <p:nvPr/>
-        </p:nvPicPr>
-        <p:blipFill>
-          <a:blip r:embed="rId3" cstate="print"/>
-          <a:srcRect/>
-          <a:stretch>
-            <a:fillRect/>
-          </a:stretch>
-        </p:blipFill>
-        <p:spPr bwMode="auto">
-          <a:xfrm>
-            <a:off x="-32" y="-24"/>
-            <a:ext cx="1070774" cy="642942"/>
-          </a:xfrm>
-          <a:prstGeom prst="rect">
-            <a:avLst/>
-          </a:prstGeom>
-          <a:noFill/>
-        </p:spPr>
-      </p:pic>
       <p:sp>
         <p:nvSpPr>
-          <p:cNvPr id="8" name="7 Rectángulo"/>
+          <p:cNvPr id="9" name="8 Rectángulo"/>
           <p:cNvSpPr/>
           <p:nvPr/>
         </p:nvSpPr>
@@ -25591,14 +26465,14 @@
       </p:sp>
       <p:pic>
         <p:nvPicPr>
-          <p:cNvPr id="9" name="8 Imagen" descr="tec-logo-full.jpg"/>
+          <p:cNvPr id="10" name="9 Imagen" descr="tec-logo-full.jpg"/>
           <p:cNvPicPr>
             <a:picLocks noChangeAspect="1"/>
           </p:cNvPicPr>
           <p:nvPr/>
         </p:nvPicPr>
         <p:blipFill>
-          <a:blip r:embed="rId4" cstate="print"/>
+          <a:blip r:embed="rId3" cstate="print"/>
           <a:stretch>
             <a:fillRect/>
           </a:stretch>
@@ -25607,6 +26481,88 @@
           <a:xfrm>
             <a:off x="7537561" y="6200801"/>
             <a:ext cx="1606471" cy="585785"/>
+          </a:xfrm>
+          <a:prstGeom prst="rect">
+            <a:avLst/>
+          </a:prstGeom>
+        </p:spPr>
+      </p:pic>
+      <p:pic>
+        <p:nvPicPr>
+          <p:cNvPr id="13" name="12 Imagen" descr="hnd0001.jpg"/>
+          <p:cNvPicPr>
+            <a:picLocks noChangeAspect="1"/>
+          </p:cNvPicPr>
+          <p:nvPr/>
+        </p:nvPicPr>
+        <p:blipFill>
+          <a:blip r:embed="rId4"/>
+          <a:srcRect t="9885" r="13670"/>
+          <a:stretch>
+            <a:fillRect/>
+          </a:stretch>
+        </p:blipFill>
+        <p:spPr>
+          <a:xfrm>
+            <a:off x="357158" y="1785926"/>
+            <a:ext cx="3249322" cy="3500462"/>
+          </a:xfrm>
+          <a:prstGeom prst="rect">
+            <a:avLst/>
+          </a:prstGeom>
+          <a:ln>
+            <a:noFill/>
+          </a:ln>
+          <a:effectLst>
+            <a:softEdge rad="112500"/>
+          </a:effectLst>
+        </p:spPr>
+      </p:pic>
+      <p:pic>
+        <p:nvPicPr>
+          <p:cNvPr id="8" name="Picture 2" descr="http://www.stockwatch.in/files/Procter-Gamble.bmp"/>
+          <p:cNvPicPr>
+            <a:picLocks noChangeAspect="1" noChangeArrowheads="1"/>
+          </p:cNvPicPr>
+          <p:nvPr/>
+        </p:nvPicPr>
+        <p:blipFill>
+          <a:blip r:embed="rId5" cstate="print"/>
+          <a:srcRect/>
+          <a:stretch>
+            <a:fillRect/>
+          </a:stretch>
+        </p:blipFill>
+        <p:spPr bwMode="auto">
+          <a:xfrm>
+            <a:off x="0" y="6215058"/>
+            <a:ext cx="1070774" cy="642942"/>
+          </a:xfrm>
+          <a:prstGeom prst="rect">
+            <a:avLst/>
+          </a:prstGeom>
+          <a:noFill/>
+        </p:spPr>
+      </p:pic>
+      <p:pic>
+        <p:nvPicPr>
+          <p:cNvPr id="14" name="13 Imagen" descr="blanco_sangre.jpg"/>
+          <p:cNvPicPr>
+            <a:picLocks noChangeAspect="1"/>
+          </p:cNvPicPr>
+          <p:nvPr/>
+        </p:nvPicPr>
+        <p:blipFill>
+          <a:blip r:embed="rId6"/>
+          <a:srcRect l="59376" t="6169" r="14374" b="35389"/>
+          <a:stretch>
+            <a:fillRect/>
+          </a:stretch>
+        </p:blipFill>
+        <p:spPr>
+          <a:xfrm>
+            <a:off x="7786742" y="244943"/>
+            <a:ext cx="785786" cy="898041"/>
           </a:xfrm>
           <a:prstGeom prst="rect">
             <a:avLst/>
@@ -25628,7 +26584,7 @@
 </p:sld>
 </file>
 
-<file path=ppt/slides/slide4.xml><?xml version="1.0" encoding="utf-8"?>
+<file path=ppt/slides/slide3.xml><?xml version="1.0" encoding="utf-8"?>
 <p:sld xmlns:a="http://schemas.openxmlformats.org/drawingml/2006/main" xmlns:r="http://schemas.openxmlformats.org/officeDocument/2006/relationships" xmlns:p="http://schemas.openxmlformats.org/presentationml/2006/main">
   <p:cSld>
     <p:spTree>
@@ -25655,7 +26611,7 @@
         </p:nvSpPr>
         <p:spPr bwMode="auto">
           <a:xfrm>
-            <a:off x="5857884" y="504825"/>
+            <a:off x="6142061" y="482582"/>
             <a:ext cx="1716087" cy="446088"/>
           </a:xfrm>
           <a:prstGeom prst="rect">
@@ -25831,32 +26787,6 @@
           </a:effectLst>
         </p:spPr>
       </p:pic>
-      <p:pic>
-        <p:nvPicPr>
-          <p:cNvPr id="9" name="Picture 2" descr="http://www.stockwatch.in/files/Procter-Gamble.bmp"/>
-          <p:cNvPicPr>
-            <a:picLocks noChangeAspect="1" noChangeArrowheads="1"/>
-          </p:cNvPicPr>
-          <p:nvPr/>
-        </p:nvPicPr>
-        <p:blipFill>
-          <a:blip r:embed="rId4" cstate="print"/>
-          <a:srcRect/>
-          <a:stretch>
-            <a:fillRect/>
-          </a:stretch>
-        </p:blipFill>
-        <p:spPr bwMode="auto">
-          <a:xfrm>
-            <a:off x="-32" y="-24"/>
-            <a:ext cx="1070774" cy="642942"/>
-          </a:xfrm>
-          <a:prstGeom prst="rect">
-            <a:avLst/>
-          </a:prstGeom>
-          <a:noFill/>
-        </p:spPr>
-      </p:pic>
       <p:sp>
         <p:nvSpPr>
           <p:cNvPr id="10" name="9 Rectángulo"/>
@@ -25918,7 +26848,7 @@
           <p:nvPr/>
         </p:nvPicPr>
         <p:blipFill>
-          <a:blip r:embed="rId5" cstate="print"/>
+          <a:blip r:embed="rId4" cstate="print"/>
           <a:stretch>
             <a:fillRect/>
           </a:stretch>
@@ -25931,6 +26861,57 @@
           <a:prstGeom prst="rect">
             <a:avLst/>
           </a:prstGeom>
+        </p:spPr>
+      </p:pic>
+      <p:pic>
+        <p:nvPicPr>
+          <p:cNvPr id="12" name="11 Imagen" descr="blanco_sangre.jpg"/>
+          <p:cNvPicPr>
+            <a:picLocks noChangeAspect="1"/>
+          </p:cNvPicPr>
+          <p:nvPr/>
+        </p:nvPicPr>
+        <p:blipFill>
+          <a:blip r:embed="rId5"/>
+          <a:srcRect l="59376" t="6169" r="14374" b="35389"/>
+          <a:stretch>
+            <a:fillRect/>
+          </a:stretch>
+        </p:blipFill>
+        <p:spPr>
+          <a:xfrm>
+            <a:off x="7786742" y="244943"/>
+            <a:ext cx="785786" cy="898041"/>
+          </a:xfrm>
+          <a:prstGeom prst="rect">
+            <a:avLst/>
+          </a:prstGeom>
+        </p:spPr>
+      </p:pic>
+      <p:pic>
+        <p:nvPicPr>
+          <p:cNvPr id="9" name="Picture 2" descr="http://www.stockwatch.in/files/Procter-Gamble.bmp"/>
+          <p:cNvPicPr>
+            <a:picLocks noChangeAspect="1" noChangeArrowheads="1"/>
+          </p:cNvPicPr>
+          <p:nvPr/>
+        </p:nvPicPr>
+        <p:blipFill>
+          <a:blip r:embed="rId6" cstate="print"/>
+          <a:srcRect/>
+          <a:stretch>
+            <a:fillRect/>
+          </a:stretch>
+        </p:blipFill>
+        <p:spPr bwMode="auto">
+          <a:xfrm>
+            <a:off x="0" y="6215058"/>
+            <a:ext cx="1070774" cy="642942"/>
+          </a:xfrm>
+          <a:prstGeom prst="rect">
+            <a:avLst/>
+          </a:prstGeom>
+          <a:noFill/>
         </p:spPr>
       </p:pic>
     </p:spTree>
@@ -25948,7 +26929,7 @@
 </p:sld>
 </file>
 
-<file path=ppt/slides/slide5.xml><?xml version="1.0" encoding="utf-8"?>
+<file path=ppt/slides/slide4.xml><?xml version="1.0" encoding="utf-8"?>
 <p:sld xmlns:a="http://schemas.openxmlformats.org/drawingml/2006/main" xmlns:r="http://schemas.openxmlformats.org/officeDocument/2006/relationships" xmlns:p="http://schemas.openxmlformats.org/presentationml/2006/main">
   <p:cSld>
     <p:spTree>
@@ -25975,7 +26956,7 @@
         </p:nvSpPr>
         <p:spPr bwMode="auto">
           <a:xfrm>
-            <a:off x="3428992" y="504825"/>
+            <a:off x="3786182" y="504825"/>
             <a:ext cx="4060825" cy="446088"/>
           </a:xfrm>
           <a:prstGeom prst="rect">
@@ -26108,32 +27089,6 @@
           </a:effectLst>
         </p:spPr>
       </p:pic>
-      <p:pic>
-        <p:nvPicPr>
-          <p:cNvPr id="8" name="Picture 2" descr="http://www.stockwatch.in/files/Procter-Gamble.bmp"/>
-          <p:cNvPicPr>
-            <a:picLocks noChangeAspect="1" noChangeArrowheads="1"/>
-          </p:cNvPicPr>
-          <p:nvPr/>
-        </p:nvPicPr>
-        <p:blipFill>
-          <a:blip r:embed="rId4" cstate="print"/>
-          <a:srcRect/>
-          <a:stretch>
-            <a:fillRect/>
-          </a:stretch>
-        </p:blipFill>
-        <p:spPr bwMode="auto">
-          <a:xfrm>
-            <a:off x="-32" y="-24"/>
-            <a:ext cx="1070774" cy="642942"/>
-          </a:xfrm>
-          <a:prstGeom prst="rect">
-            <a:avLst/>
-          </a:prstGeom>
-          <a:noFill/>
-        </p:spPr>
-      </p:pic>
       <p:sp>
         <p:nvSpPr>
           <p:cNvPr id="9" name="8 Rectángulo"/>
@@ -26195,7 +27150,7 @@
           <p:nvPr/>
         </p:nvPicPr>
         <p:blipFill>
-          <a:blip r:embed="rId5" cstate="print"/>
+          <a:blip r:embed="rId4" cstate="print"/>
           <a:stretch>
             <a:fillRect/>
           </a:stretch>
@@ -26208,6 +27163,57 @@
           <a:prstGeom prst="rect">
             <a:avLst/>
           </a:prstGeom>
+        </p:spPr>
+      </p:pic>
+      <p:pic>
+        <p:nvPicPr>
+          <p:cNvPr id="11" name="10 Imagen" descr="blanco_sangre.jpg"/>
+          <p:cNvPicPr>
+            <a:picLocks noChangeAspect="1"/>
+          </p:cNvPicPr>
+          <p:nvPr/>
+        </p:nvPicPr>
+        <p:blipFill>
+          <a:blip r:embed="rId5"/>
+          <a:srcRect l="59376" t="6169" r="14374" b="35389"/>
+          <a:stretch>
+            <a:fillRect/>
+          </a:stretch>
+        </p:blipFill>
+        <p:spPr>
+          <a:xfrm>
+            <a:off x="7786742" y="244943"/>
+            <a:ext cx="785786" cy="898041"/>
+          </a:xfrm>
+          <a:prstGeom prst="rect">
+            <a:avLst/>
+          </a:prstGeom>
+        </p:spPr>
+      </p:pic>
+      <p:pic>
+        <p:nvPicPr>
+          <p:cNvPr id="8" name="Picture 2" descr="http://www.stockwatch.in/files/Procter-Gamble.bmp"/>
+          <p:cNvPicPr>
+            <a:picLocks noChangeAspect="1" noChangeArrowheads="1"/>
+          </p:cNvPicPr>
+          <p:nvPr/>
+        </p:nvPicPr>
+        <p:blipFill>
+          <a:blip r:embed="rId6" cstate="print"/>
+          <a:srcRect/>
+          <a:stretch>
+            <a:fillRect/>
+          </a:stretch>
+        </p:blipFill>
+        <p:spPr bwMode="auto">
+          <a:xfrm>
+            <a:off x="0" y="6215058"/>
+            <a:ext cx="1070774" cy="642942"/>
+          </a:xfrm>
+          <a:prstGeom prst="rect">
+            <a:avLst/>
+          </a:prstGeom>
+          <a:noFill/>
         </p:spPr>
       </p:pic>
     </p:spTree>
@@ -26225,7 +27231,7 @@
 </p:sld>
 </file>
 
-<file path=ppt/slides/slide6.xml><?xml version="1.0" encoding="utf-8"?>
+<file path=ppt/slides/slide5.xml><?xml version="1.0" encoding="utf-8"?>
 <p:sld xmlns:a="http://schemas.openxmlformats.org/drawingml/2006/main" xmlns:r="http://schemas.openxmlformats.org/officeDocument/2006/relationships" xmlns:p="http://schemas.openxmlformats.org/presentationml/2006/main">
   <p:cSld>
     <p:spTree>
@@ -26252,7 +27258,7 @@
         </p:nvSpPr>
         <p:spPr bwMode="auto">
           <a:xfrm>
-            <a:off x="4825890" y="504825"/>
+            <a:off x="5286380" y="504825"/>
             <a:ext cx="2603597" cy="446276"/>
           </a:xfrm>
           <a:prstGeom prst="rect">
@@ -26307,32 +27313,6 @@
           </a:graphicData>
         </a:graphic>
       </p:graphicFrame>
-      <p:pic>
-        <p:nvPicPr>
-          <p:cNvPr id="7" name="Picture 2" descr="http://www.stockwatch.in/files/Procter-Gamble.bmp"/>
-          <p:cNvPicPr>
-            <a:picLocks noChangeAspect="1" noChangeArrowheads="1"/>
-          </p:cNvPicPr>
-          <p:nvPr/>
-        </p:nvPicPr>
-        <p:blipFill>
-          <a:blip r:embed="rId7" cstate="print"/>
-          <a:srcRect/>
-          <a:stretch>
-            <a:fillRect/>
-          </a:stretch>
-        </p:blipFill>
-        <p:spPr bwMode="auto">
-          <a:xfrm>
-            <a:off x="-32" y="-24"/>
-            <a:ext cx="1070774" cy="642942"/>
-          </a:xfrm>
-          <a:prstGeom prst="rect">
-            <a:avLst/>
-          </a:prstGeom>
-          <a:noFill/>
-        </p:spPr>
-      </p:pic>
       <p:sp>
         <p:nvSpPr>
           <p:cNvPr id="8" name="7 Rectángulo"/>
@@ -26394,7 +27374,7 @@
           <p:nvPr/>
         </p:nvPicPr>
         <p:blipFill>
-          <a:blip r:embed="rId8" cstate="print"/>
+          <a:blip r:embed="rId7" cstate="print"/>
           <a:stretch>
             <a:fillRect/>
           </a:stretch>
@@ -26407,6 +27387,57 @@
           <a:prstGeom prst="rect">
             <a:avLst/>
           </a:prstGeom>
+        </p:spPr>
+      </p:pic>
+      <p:pic>
+        <p:nvPicPr>
+          <p:cNvPr id="11" name="10 Imagen" descr="blanco_sangre.jpg"/>
+          <p:cNvPicPr>
+            <a:picLocks noChangeAspect="1"/>
+          </p:cNvPicPr>
+          <p:nvPr/>
+        </p:nvPicPr>
+        <p:blipFill>
+          <a:blip r:embed="rId8"/>
+          <a:srcRect l="59376" t="6169" r="14374" b="35389"/>
+          <a:stretch>
+            <a:fillRect/>
+          </a:stretch>
+        </p:blipFill>
+        <p:spPr>
+          <a:xfrm>
+            <a:off x="7786742" y="244943"/>
+            <a:ext cx="785786" cy="898041"/>
+          </a:xfrm>
+          <a:prstGeom prst="rect">
+            <a:avLst/>
+          </a:prstGeom>
+        </p:spPr>
+      </p:pic>
+      <p:pic>
+        <p:nvPicPr>
+          <p:cNvPr id="7" name="Picture 2" descr="http://www.stockwatch.in/files/Procter-Gamble.bmp"/>
+          <p:cNvPicPr>
+            <a:picLocks noChangeAspect="1" noChangeArrowheads="1"/>
+          </p:cNvPicPr>
+          <p:nvPr/>
+        </p:nvPicPr>
+        <p:blipFill>
+          <a:blip r:embed="rId9" cstate="print"/>
+          <a:srcRect/>
+          <a:stretch>
+            <a:fillRect/>
+          </a:stretch>
+        </p:blipFill>
+        <p:spPr bwMode="auto">
+          <a:xfrm>
+            <a:off x="0" y="6215058"/>
+            <a:ext cx="1070774" cy="642942"/>
+          </a:xfrm>
+          <a:prstGeom prst="rect">
+            <a:avLst/>
+          </a:prstGeom>
+          <a:noFill/>
         </p:spPr>
       </p:pic>
     </p:spTree>
@@ -26424,7 +27455,7 @@
 </p:sld>
 </file>
 
-<file path=ppt/slides/slide7.xml><?xml version="1.0" encoding="utf-8"?>
+<file path=ppt/slides/slide6.xml><?xml version="1.0" encoding="utf-8"?>
 <p:sld xmlns:a="http://schemas.openxmlformats.org/drawingml/2006/main" xmlns:r="http://schemas.openxmlformats.org/officeDocument/2006/relationships" xmlns:p="http://schemas.openxmlformats.org/presentationml/2006/main">
   <p:cSld>
     <p:spTree>
@@ -26451,7 +27482,7 @@
         </p:nvSpPr>
         <p:spPr bwMode="auto">
           <a:xfrm>
-            <a:off x="928662" y="285728"/>
+            <a:off x="1357290" y="500042"/>
             <a:ext cx="6526245" cy="446088"/>
           </a:xfrm>
           <a:prstGeom prst="rect">
@@ -26506,32 +27537,6 @@
           </a:graphicData>
         </a:graphic>
       </p:graphicFrame>
-      <p:pic>
-        <p:nvPicPr>
-          <p:cNvPr id="8" name="Picture 2" descr="http://www.stockwatch.in/files/Procter-Gamble.bmp"/>
-          <p:cNvPicPr>
-            <a:picLocks noChangeAspect="1" noChangeArrowheads="1"/>
-          </p:cNvPicPr>
-          <p:nvPr/>
-        </p:nvPicPr>
-        <p:blipFill>
-          <a:blip r:embed="rId7" cstate="print"/>
-          <a:srcRect/>
-          <a:stretch>
-            <a:fillRect/>
-          </a:stretch>
-        </p:blipFill>
-        <p:spPr bwMode="auto">
-          <a:xfrm>
-            <a:off x="-32" y="-24"/>
-            <a:ext cx="1070774" cy="642942"/>
-          </a:xfrm>
-          <a:prstGeom prst="rect">
-            <a:avLst/>
-          </a:prstGeom>
-          <a:noFill/>
-        </p:spPr>
-      </p:pic>
       <p:sp>
         <p:nvSpPr>
           <p:cNvPr id="9" name="8 Rectángulo"/>
@@ -26593,7 +27598,7 @@
           <p:nvPr/>
         </p:nvPicPr>
         <p:blipFill>
-          <a:blip r:embed="rId8" cstate="print"/>
+          <a:blip r:embed="rId7" cstate="print"/>
           <a:stretch>
             <a:fillRect/>
           </a:stretch>
@@ -26606,6 +27611,57 @@
           <a:prstGeom prst="rect">
             <a:avLst/>
           </a:prstGeom>
+        </p:spPr>
+      </p:pic>
+      <p:pic>
+        <p:nvPicPr>
+          <p:cNvPr id="11" name="10 Imagen" descr="blanco_sangre.jpg"/>
+          <p:cNvPicPr>
+            <a:picLocks noChangeAspect="1"/>
+          </p:cNvPicPr>
+          <p:nvPr/>
+        </p:nvPicPr>
+        <p:blipFill>
+          <a:blip r:embed="rId8"/>
+          <a:srcRect l="59376" t="6169" r="14374" b="35389"/>
+          <a:stretch>
+            <a:fillRect/>
+          </a:stretch>
+        </p:blipFill>
+        <p:spPr>
+          <a:xfrm>
+            <a:off x="7786742" y="244943"/>
+            <a:ext cx="785786" cy="898041"/>
+          </a:xfrm>
+          <a:prstGeom prst="rect">
+            <a:avLst/>
+          </a:prstGeom>
+        </p:spPr>
+      </p:pic>
+      <p:pic>
+        <p:nvPicPr>
+          <p:cNvPr id="8" name="Picture 2" descr="http://www.stockwatch.in/files/Procter-Gamble.bmp"/>
+          <p:cNvPicPr>
+            <a:picLocks noChangeAspect="1" noChangeArrowheads="1"/>
+          </p:cNvPicPr>
+          <p:nvPr/>
+        </p:nvPicPr>
+        <p:blipFill>
+          <a:blip r:embed="rId9" cstate="print"/>
+          <a:srcRect/>
+          <a:stretch>
+            <a:fillRect/>
+          </a:stretch>
+        </p:blipFill>
+        <p:spPr bwMode="auto">
+          <a:xfrm>
+            <a:off x="0" y="6215058"/>
+            <a:ext cx="1070774" cy="642942"/>
+          </a:xfrm>
+          <a:prstGeom prst="rect">
+            <a:avLst/>
+          </a:prstGeom>
+          <a:noFill/>
         </p:spPr>
       </p:pic>
     </p:spTree>
@@ -26623,7 +27679,7 @@
 </p:sld>
 </file>
 
-<file path=ppt/slides/slide8.xml><?xml version="1.0" encoding="utf-8"?>
+<file path=ppt/slides/slide7.xml><?xml version="1.0" encoding="utf-8"?>
 <p:sld xmlns:a="http://schemas.openxmlformats.org/drawingml/2006/main" xmlns:r="http://schemas.openxmlformats.org/officeDocument/2006/relationships" xmlns:p="http://schemas.openxmlformats.org/presentationml/2006/main">
   <p:cSld>
     <p:spTree>
@@ -26656,32 +27712,6 @@
           </a:graphicData>
         </a:graphic>
       </p:graphicFrame>
-      <p:pic>
-        <p:nvPicPr>
-          <p:cNvPr id="6" name="Picture 2" descr="http://www.stockwatch.in/files/Procter-Gamble.bmp"/>
-          <p:cNvPicPr>
-            <a:picLocks noChangeAspect="1" noChangeArrowheads="1"/>
-          </p:cNvPicPr>
-          <p:nvPr/>
-        </p:nvPicPr>
-        <p:blipFill>
-          <a:blip r:embed="rId7" cstate="print"/>
-          <a:srcRect/>
-          <a:stretch>
-            <a:fillRect/>
-          </a:stretch>
-        </p:blipFill>
-        <p:spPr bwMode="auto">
-          <a:xfrm>
-            <a:off x="-32" y="-24"/>
-            <a:ext cx="1070774" cy="642942"/>
-          </a:xfrm>
-          <a:prstGeom prst="rect">
-            <a:avLst/>
-          </a:prstGeom>
-          <a:noFill/>
-        </p:spPr>
-      </p:pic>
       <p:sp>
         <p:nvSpPr>
           <p:cNvPr id="8" name="7 Rectángulo"/>
@@ -26743,7 +27773,7 @@
           <p:nvPr/>
         </p:nvPicPr>
         <p:blipFill>
-          <a:blip r:embed="rId8" cstate="print"/>
+          <a:blip r:embed="rId7" cstate="print"/>
           <a:stretch>
             <a:fillRect/>
           </a:stretch>
@@ -26752,6 +27782,57 @@
           <a:xfrm>
             <a:off x="7537561" y="6200801"/>
             <a:ext cx="1606471" cy="585785"/>
+          </a:xfrm>
+          <a:prstGeom prst="rect">
+            <a:avLst/>
+          </a:prstGeom>
+        </p:spPr>
+      </p:pic>
+      <p:pic>
+        <p:nvPicPr>
+          <p:cNvPr id="6" name="Picture 2" descr="http://www.stockwatch.in/files/Procter-Gamble.bmp"/>
+          <p:cNvPicPr>
+            <a:picLocks noChangeAspect="1" noChangeArrowheads="1"/>
+          </p:cNvPicPr>
+          <p:nvPr/>
+        </p:nvPicPr>
+        <p:blipFill>
+          <a:blip r:embed="rId8" cstate="print"/>
+          <a:srcRect/>
+          <a:stretch>
+            <a:fillRect/>
+          </a:stretch>
+        </p:blipFill>
+        <p:spPr bwMode="auto">
+          <a:xfrm>
+            <a:off x="0" y="6215058"/>
+            <a:ext cx="1070774" cy="642942"/>
+          </a:xfrm>
+          <a:prstGeom prst="rect">
+            <a:avLst/>
+          </a:prstGeom>
+          <a:noFill/>
+        </p:spPr>
+      </p:pic>
+      <p:pic>
+        <p:nvPicPr>
+          <p:cNvPr id="11" name="10 Imagen" descr="blanco_sangre.jpg"/>
+          <p:cNvPicPr>
+            <a:picLocks noChangeAspect="1"/>
+          </p:cNvPicPr>
+          <p:nvPr/>
+        </p:nvPicPr>
+        <p:blipFill>
+          <a:blip r:embed="rId9"/>
+          <a:srcRect l="60600" t="6169" r="14374" b="37509"/>
+          <a:stretch>
+            <a:fillRect/>
+          </a:stretch>
+        </p:blipFill>
+        <p:spPr>
+          <a:xfrm>
+            <a:off x="6929454" y="244943"/>
+            <a:ext cx="1643074" cy="1898173"/>
           </a:xfrm>
           <a:prstGeom prst="rect">
             <a:avLst/>
@@ -26773,7 +27854,7 @@
 </p:sld>
 </file>
 
-<file path=ppt/slides/slide9.xml><?xml version="1.0" encoding="utf-8"?>
+<file path=ppt/slides/slide8.xml><?xml version="1.0" encoding="utf-8"?>
 <p:sld xmlns:a="http://schemas.openxmlformats.org/drawingml/2006/main" xmlns:r="http://schemas.openxmlformats.org/officeDocument/2006/relationships" xmlns:p="http://schemas.openxmlformats.org/presentationml/2006/main">
   <p:cSld>
     <p:spTree>
@@ -26800,7 +27881,7 @@
         </p:nvSpPr>
         <p:spPr bwMode="auto">
           <a:xfrm>
-            <a:off x="4740501" y="504825"/>
+            <a:off x="5286380" y="504825"/>
             <a:ext cx="2571538" cy="446276"/>
           </a:xfrm>
           <a:prstGeom prst="rect">
@@ -26877,7 +27958,25 @@
                 </a:solidFill>
                 <a:latin typeface="Century Gothic" pitchFamily="34" charset="0"/>
               </a:rPr>
-              <a:t>Es el encargado de monitorear el control de cambios desde que se genera asta que se ejecuta o es rechazado.</a:t>
+              <a:t>Es el encargado de monitorear el control de cambios desde que se genera </a:t>
+            </a:r>
+            <a:r>
+              <a:rPr lang="es-MX" sz="1600" dirty="0" smtClean="0">
+                <a:solidFill>
+                  <a:srgbClr val="235397"/>
+                </a:solidFill>
+                <a:latin typeface="Century Gothic" pitchFamily="34" charset="0"/>
+              </a:rPr>
+              <a:t>hasta </a:t>
+            </a:r>
+            <a:r>
+              <a:rPr lang="es-MX" sz="1600" dirty="0" smtClean="0">
+                <a:solidFill>
+                  <a:srgbClr val="235397"/>
+                </a:solidFill>
+                <a:latin typeface="Century Gothic" pitchFamily="34" charset="0"/>
+              </a:rPr>
+              <a:t>que se ejecuta o es rechazado.</a:t>
             </a:r>
           </a:p>
           <a:p>
@@ -27053,32 +28152,6 @@
           </a:p>
         </p:txBody>
       </p:sp>
-      <p:pic>
-        <p:nvPicPr>
-          <p:cNvPr id="7" name="Picture 2" descr="http://www.stockwatch.in/files/Procter-Gamble.bmp"/>
-          <p:cNvPicPr>
-            <a:picLocks noChangeAspect="1" noChangeArrowheads="1"/>
-          </p:cNvPicPr>
-          <p:nvPr/>
-        </p:nvPicPr>
-        <p:blipFill>
-          <a:blip r:embed="rId3" cstate="print"/>
-          <a:srcRect/>
-          <a:stretch>
-            <a:fillRect/>
-          </a:stretch>
-        </p:blipFill>
-        <p:spPr bwMode="auto">
-          <a:xfrm>
-            <a:off x="-32" y="-24"/>
-            <a:ext cx="1070774" cy="642942"/>
-          </a:xfrm>
-          <a:prstGeom prst="rect">
-            <a:avLst/>
-          </a:prstGeom>
-          <a:noFill/>
-        </p:spPr>
-      </p:pic>
       <p:sp>
         <p:nvSpPr>
           <p:cNvPr id="8" name="7 Rectángulo"/>
@@ -27140,7 +28213,7 @@
           <p:nvPr/>
         </p:nvPicPr>
         <p:blipFill>
-          <a:blip r:embed="rId4" cstate="print"/>
+          <a:blip r:embed="rId3" cstate="print"/>
           <a:stretch>
             <a:fillRect/>
           </a:stretch>
@@ -27153,6 +28226,380 @@
           <a:prstGeom prst="rect">
             <a:avLst/>
           </a:prstGeom>
+        </p:spPr>
+      </p:pic>
+      <p:pic>
+        <p:nvPicPr>
+          <p:cNvPr id="10" name="9 Imagen" descr="blanco_sangre.jpg"/>
+          <p:cNvPicPr>
+            <a:picLocks noChangeAspect="1"/>
+          </p:cNvPicPr>
+          <p:nvPr/>
+        </p:nvPicPr>
+        <p:blipFill>
+          <a:blip r:embed="rId4"/>
+          <a:srcRect l="59376" t="6169" r="14374" b="35389"/>
+          <a:stretch>
+            <a:fillRect/>
+          </a:stretch>
+        </p:blipFill>
+        <p:spPr>
+          <a:xfrm>
+            <a:off x="7786742" y="244943"/>
+            <a:ext cx="785786" cy="898041"/>
+          </a:xfrm>
+          <a:prstGeom prst="rect">
+            <a:avLst/>
+          </a:prstGeom>
+        </p:spPr>
+      </p:pic>
+      <p:pic>
+        <p:nvPicPr>
+          <p:cNvPr id="7" name="Picture 2" descr="http://www.stockwatch.in/files/Procter-Gamble.bmp"/>
+          <p:cNvPicPr>
+            <a:picLocks noChangeAspect="1" noChangeArrowheads="1"/>
+          </p:cNvPicPr>
+          <p:nvPr/>
+        </p:nvPicPr>
+        <p:blipFill>
+          <a:blip r:embed="rId5" cstate="print"/>
+          <a:srcRect/>
+          <a:stretch>
+            <a:fillRect/>
+          </a:stretch>
+        </p:blipFill>
+        <p:spPr bwMode="auto">
+          <a:xfrm>
+            <a:off x="0" y="6215058"/>
+            <a:ext cx="1070774" cy="642942"/>
+          </a:xfrm>
+          <a:prstGeom prst="rect">
+            <a:avLst/>
+          </a:prstGeom>
+          <a:noFill/>
+        </p:spPr>
+      </p:pic>
+      <p:pic>
+        <p:nvPicPr>
+          <p:cNvPr id="11" name="10 Imagen" descr="wse244075.jpg"/>
+          <p:cNvPicPr>
+            <a:picLocks noChangeAspect="1"/>
+          </p:cNvPicPr>
+          <p:nvPr/>
+        </p:nvPicPr>
+        <p:blipFill>
+          <a:blip r:embed="rId6"/>
+          <a:srcRect t="2809" r="21249"/>
+          <a:stretch>
+            <a:fillRect/>
+          </a:stretch>
+        </p:blipFill>
+        <p:spPr>
+          <a:xfrm>
+            <a:off x="4429124" y="2651352"/>
+            <a:ext cx="4143404" cy="3413352"/>
+          </a:xfrm>
+          <a:prstGeom prst="rect">
+            <a:avLst/>
+          </a:prstGeom>
+          <a:ln>
+            <a:noFill/>
+          </a:ln>
+          <a:effectLst>
+            <a:softEdge rad="112500"/>
+          </a:effectLst>
+        </p:spPr>
+      </p:pic>
+    </p:spTree>
+  </p:cSld>
+  <p:clrMapOvr>
+    <a:masterClrMapping/>
+  </p:clrMapOvr>
+  <p:timing>
+    <p:tnLst>
+      <p:par>
+        <p:cTn id="1" dur="indefinite" restart="never" nodeType="tmRoot"/>
+      </p:par>
+    </p:tnLst>
+  </p:timing>
+</p:sld>
+</file>
+
+<file path=ppt/slides/slide9.xml><?xml version="1.0" encoding="utf-8"?>
+<p:sld xmlns:a="http://schemas.openxmlformats.org/drawingml/2006/main" xmlns:r="http://schemas.openxmlformats.org/officeDocument/2006/relationships" xmlns:p="http://schemas.openxmlformats.org/presentationml/2006/main">
+  <p:cSld>
+    <p:spTree>
+      <p:nvGrpSpPr>
+        <p:cNvPr id="1" name=""/>
+        <p:cNvGrpSpPr/>
+        <p:nvPr/>
+      </p:nvGrpSpPr>
+      <p:grpSpPr>
+        <a:xfrm>
+          <a:off x="0" y="0"/>
+          <a:ext cx="0" cy="0"/>
+          <a:chOff x="0" y="0"/>
+          <a:chExt cx="0" cy="0"/>
+        </a:xfrm>
+      </p:grpSpPr>
+      <p:sp>
+        <p:nvSpPr>
+          <p:cNvPr id="6" name="CuadroTexto 2"/>
+          <p:cNvSpPr txBox="1">
+            <a:spLocks noChangeArrowheads="1"/>
+          </p:cNvSpPr>
+          <p:nvPr/>
+        </p:nvSpPr>
+        <p:spPr bwMode="auto">
+          <a:xfrm>
+            <a:off x="6429388" y="482394"/>
+            <a:ext cx="1417376" cy="446276"/>
+          </a:xfrm>
+          <a:prstGeom prst="rect">
+            <a:avLst/>
+          </a:prstGeom>
+          <a:noFill/>
+          <a:ln w="9525">
+            <a:noFill/>
+            <a:miter lim="800000"/>
+            <a:headEnd/>
+            <a:tailEnd/>
+          </a:ln>
+        </p:spPr>
+        <p:txBody>
+          <a:bodyPr wrap="none">
+            <a:spAutoFit/>
+          </a:bodyPr>
+          <a:lstStyle/>
+          <a:p>
+            <a:pPr algn="r"/>
+            <a:r>
+              <a:rPr lang="es-ES_tradnl" sz="2300" dirty="0" smtClean="0">
+                <a:solidFill>
+                  <a:srgbClr val="929396"/>
+                </a:solidFill>
+                <a:latin typeface="Century Gothic" pitchFamily="34" charset="0"/>
+              </a:rPr>
+              <a:t>REPORTE</a:t>
+            </a:r>
+            <a:endParaRPr lang="es-ES_tradnl" sz="2300" dirty="0">
+              <a:solidFill>
+                <a:srgbClr val="929396"/>
+              </a:solidFill>
+              <a:latin typeface="Century Gothic" pitchFamily="34" charset="0"/>
+            </a:endParaRPr>
+          </a:p>
+        </p:txBody>
+      </p:sp>
+      <p:sp>
+        <p:nvSpPr>
+          <p:cNvPr id="7" name="CuadroTexto 5"/>
+          <p:cNvSpPr txBox="1">
+            <a:spLocks noChangeArrowheads="1"/>
+          </p:cNvSpPr>
+          <p:nvPr/>
+        </p:nvSpPr>
+        <p:spPr bwMode="auto">
+          <a:xfrm>
+            <a:off x="357158" y="1071546"/>
+            <a:ext cx="8286780" cy="338554"/>
+          </a:xfrm>
+          <a:prstGeom prst="rect">
+            <a:avLst/>
+          </a:prstGeom>
+          <a:noFill/>
+          <a:ln w="9525">
+            <a:noFill/>
+            <a:miter lim="800000"/>
+            <a:headEnd/>
+            <a:tailEnd/>
+          </a:ln>
+        </p:spPr>
+        <p:txBody>
+          <a:bodyPr wrap="square">
+            <a:spAutoFit/>
+          </a:bodyPr>
+          <a:lstStyle/>
+          <a:p>
+            <a:pPr algn="just"/>
+            <a:r>
+              <a:rPr lang="es-MX" sz="1600" dirty="0" smtClean="0">
+                <a:solidFill>
+                  <a:srgbClr val="235397"/>
+                </a:solidFill>
+                <a:latin typeface="Century Gothic" pitchFamily="34" charset="0"/>
+              </a:rPr>
+              <a:t>Muestra el </a:t>
+            </a:r>
+            <a:r>
+              <a:rPr lang="es-MX" sz="1600" dirty="0" smtClean="0">
+                <a:solidFill>
+                  <a:srgbClr val="235397"/>
+                </a:solidFill>
+                <a:latin typeface="Century Gothic" pitchFamily="34" charset="0"/>
+              </a:rPr>
+              <a:t>informe general de los cambios</a:t>
+            </a:r>
+            <a:endParaRPr lang="es-MX" sz="1600" dirty="0">
+              <a:solidFill>
+                <a:srgbClr val="235397"/>
+              </a:solidFill>
+              <a:latin typeface="Century Gothic" pitchFamily="34" charset="0"/>
+            </a:endParaRPr>
+          </a:p>
+        </p:txBody>
+      </p:sp>
+      <p:sp>
+        <p:nvSpPr>
+          <p:cNvPr id="8" name="7 Rectángulo"/>
+          <p:cNvSpPr/>
+          <p:nvPr/>
+        </p:nvSpPr>
+        <p:spPr>
+          <a:xfrm>
+            <a:off x="0" y="6429396"/>
+            <a:ext cx="9144000" cy="285728"/>
+          </a:xfrm>
+          <a:prstGeom prst="rect">
+            <a:avLst/>
+          </a:prstGeom>
+          <a:solidFill>
+            <a:schemeClr val="accent1">
+              <a:lumMod val="75000"/>
+            </a:schemeClr>
+          </a:solidFill>
+          <a:ln>
+            <a:solidFill>
+              <a:schemeClr val="accent1">
+                <a:lumMod val="75000"/>
+              </a:schemeClr>
+            </a:solidFill>
+          </a:ln>
+        </p:spPr>
+        <p:style>
+          <a:lnRef idx="2">
+            <a:schemeClr val="accent1">
+              <a:shade val="50000"/>
+            </a:schemeClr>
+          </a:lnRef>
+          <a:fillRef idx="1">
+            <a:schemeClr val="accent1"/>
+          </a:fillRef>
+          <a:effectRef idx="0">
+            <a:schemeClr val="accent1"/>
+          </a:effectRef>
+          <a:fontRef idx="minor">
+            <a:schemeClr val="lt1"/>
+          </a:fontRef>
+        </p:style>
+        <p:txBody>
+          <a:bodyPr rtlCol="0" anchor="ctr"/>
+          <a:lstStyle/>
+          <a:p>
+            <a:pPr algn="ctr"/>
+            <a:endParaRPr lang="es-MX"/>
+          </a:p>
+        </p:txBody>
+      </p:sp>
+      <p:pic>
+        <p:nvPicPr>
+          <p:cNvPr id="11" name="10 Imagen" descr="tec-logo-full.jpg"/>
+          <p:cNvPicPr>
+            <a:picLocks noChangeAspect="1"/>
+          </p:cNvPicPr>
+          <p:nvPr/>
+        </p:nvPicPr>
+        <p:blipFill>
+          <a:blip r:embed="rId3" cstate="print"/>
+          <a:stretch>
+            <a:fillRect/>
+          </a:stretch>
+        </p:blipFill>
+        <p:spPr>
+          <a:xfrm>
+            <a:off x="7537561" y="6200801"/>
+            <a:ext cx="1606471" cy="585785"/>
+          </a:xfrm>
+          <a:prstGeom prst="rect">
+            <a:avLst/>
+          </a:prstGeom>
+        </p:spPr>
+      </p:pic>
+      <p:pic>
+        <p:nvPicPr>
+          <p:cNvPr id="73730" name="Picture 2" descr="F:\prints\reporte.bmp"/>
+          <p:cNvPicPr>
+            <a:picLocks noChangeAspect="1" noChangeArrowheads="1"/>
+          </p:cNvPicPr>
+          <p:nvPr/>
+        </p:nvPicPr>
+        <p:blipFill>
+          <a:blip r:embed="rId4"/>
+          <a:srcRect/>
+          <a:stretch>
+            <a:fillRect/>
+          </a:stretch>
+        </p:blipFill>
+        <p:spPr bwMode="auto">
+          <a:xfrm>
+            <a:off x="420479" y="1428736"/>
+            <a:ext cx="7866297" cy="4863370"/>
+          </a:xfrm>
+          <a:prstGeom prst="rect">
+            <a:avLst/>
+          </a:prstGeom>
+          <a:noFill/>
+        </p:spPr>
+      </p:pic>
+      <p:pic>
+        <p:nvPicPr>
+          <p:cNvPr id="9" name="8 Imagen" descr="blanco_sangre.jpg"/>
+          <p:cNvPicPr>
+            <a:picLocks noChangeAspect="1"/>
+          </p:cNvPicPr>
+          <p:nvPr/>
+        </p:nvPicPr>
+        <p:blipFill>
+          <a:blip r:embed="rId5"/>
+          <a:srcRect l="59376" t="6169" r="14374" b="35389"/>
+          <a:stretch>
+            <a:fillRect/>
+          </a:stretch>
+        </p:blipFill>
+        <p:spPr>
+          <a:xfrm>
+            <a:off x="7786742" y="244943"/>
+            <a:ext cx="785786" cy="898041"/>
+          </a:xfrm>
+          <a:prstGeom prst="rect">
+            <a:avLst/>
+          </a:prstGeom>
+        </p:spPr>
+      </p:pic>
+      <p:pic>
+        <p:nvPicPr>
+          <p:cNvPr id="36866" name="Picture 2" descr="http://www.stockwatch.in/files/Procter-Gamble.bmp"/>
+          <p:cNvPicPr>
+            <a:picLocks noChangeAspect="1" noChangeArrowheads="1"/>
+          </p:cNvPicPr>
+          <p:nvPr/>
+        </p:nvPicPr>
+        <p:blipFill>
+          <a:blip r:embed="rId6" cstate="print"/>
+          <a:srcRect/>
+          <a:stretch>
+            <a:fillRect/>
+          </a:stretch>
+        </p:blipFill>
+        <p:spPr bwMode="auto">
+          <a:xfrm>
+            <a:off x="0" y="6215058"/>
+            <a:ext cx="1070774" cy="642942"/>
+          </a:xfrm>
+          <a:prstGeom prst="rect">
+            <a:avLst/>
+          </a:prstGeom>
+          <a:noFill/>
         </p:spPr>
       </p:pic>
     </p:spTree>

</xml_diff>